<commit_message>
Added Milan and Mayank
</commit_message>
<xml_diff>
--- a/parser-presentation.pptx
+++ b/parser-presentation.pptx
@@ -9,6 +9,10 @@
     <p:sldId id="257" r:id="rId3"/>
     <p:sldId id="258" r:id="rId4"/>
     <p:sldId id="259" r:id="rId5"/>
+    <p:sldId id="262" r:id="rId6"/>
+    <p:sldId id="263" r:id="rId7"/>
+    <p:sldId id="260" r:id="rId8"/>
+    <p:sldId id="261" r:id="rId9"/>
   </p:sldIdLst>
   <p:sldSz cx="9144000" cy="6858000" type="screen4x3"/>
   <p:notesSz cx="6858000" cy="9144000"/>
@@ -107,6 +111,22 @@
       </a:defRPr>
     </a:lvl9pPr>
   </p:defaultTextStyle>
+  <p:extLst>
+    <p:ext uri="{EFAFB233-063F-42B5-8137-9DF3F51BA10A}">
+      <p15:sldGuideLst xmlns:p15="http://schemas.microsoft.com/office/powerpoint/2012/main">
+        <p15:guide id="1" orient="horz" pos="2160">
+          <p15:clr>
+            <a:srgbClr val="A4A3A4"/>
+          </p15:clr>
+        </p15:guide>
+        <p15:guide id="2" pos="2880">
+          <p15:clr>
+            <a:srgbClr val="A4A3A4"/>
+          </p15:clr>
+        </p15:guide>
+      </p15:sldGuideLst>
+    </p:ext>
+  </p:extLst>
 </p:presentation>
 </file>
 
@@ -148,10 +168,9 @@
           <a:lstStyle/>
           <a:p>
             <a:r>
-              <a:rPr lang="sk-SK" smtClean="0"/>
+              <a:rPr lang="sk-SK"/>
               <a:t>Kliknite sem a upravte štýl predlohy nadpisov.</a:t>
             </a:r>
-            <a:endParaRPr lang="sk-SK"/>
           </a:p>
         </p:txBody>
       </p:sp>
@@ -267,10 +286,9 @@
           </a:lstStyle>
           <a:p>
             <a:r>
-              <a:rPr lang="sk-SK" smtClean="0"/>
+              <a:rPr lang="sk-SK"/>
               <a:t>Kliknite sem a upravte štýl predlohy podnadpisov.</a:t>
             </a:r>
-            <a:endParaRPr lang="sk-SK"/>
           </a:p>
         </p:txBody>
       </p:sp>
@@ -291,7 +309,7 @@
           <a:p>
             <a:fld id="{071090A5-4B13-4620-ADE1-3276C2D13370}" type="datetimeFigureOut">
               <a:rPr lang="sk-SK" smtClean="0"/>
-              <a:t>11. 10. 2016</a:t>
+              <a:t>11.10.2016</a:t>
             </a:fld>
             <a:endParaRPr lang="sk-SK"/>
           </a:p>
@@ -380,10 +398,9 @@
           <a:lstStyle/>
           <a:p>
             <a:r>
-              <a:rPr lang="sk-SK" smtClean="0"/>
+              <a:rPr lang="sk-SK"/>
               <a:t>Kliknite sem a upravte štýl predlohy nadpisov.</a:t>
             </a:r>
-            <a:endParaRPr lang="sk-SK"/>
           </a:p>
         </p:txBody>
       </p:sp>
@@ -404,38 +421,37 @@
           <a:p>
             <a:pPr lvl="0"/>
             <a:r>
-              <a:rPr lang="sk-SK" smtClean="0"/>
+              <a:rPr lang="sk-SK"/>
               <a:t>Kliknite sem a upravte štýly predlohy textu.</a:t>
             </a:r>
           </a:p>
           <a:p>
             <a:pPr lvl="1"/>
             <a:r>
-              <a:rPr lang="sk-SK" smtClean="0"/>
+              <a:rPr lang="sk-SK"/>
               <a:t>Druhá úroveň</a:t>
             </a:r>
           </a:p>
           <a:p>
             <a:pPr lvl="2"/>
             <a:r>
-              <a:rPr lang="sk-SK" smtClean="0"/>
+              <a:rPr lang="sk-SK"/>
               <a:t>Tretia úroveň</a:t>
             </a:r>
           </a:p>
           <a:p>
             <a:pPr lvl="3"/>
             <a:r>
-              <a:rPr lang="sk-SK" smtClean="0"/>
+              <a:rPr lang="sk-SK"/>
               <a:t>Štvrtá úroveň</a:t>
             </a:r>
           </a:p>
           <a:p>
             <a:pPr lvl="4"/>
             <a:r>
-              <a:rPr lang="sk-SK" smtClean="0"/>
+              <a:rPr lang="sk-SK"/>
               <a:t>Piata úroveň</a:t>
             </a:r>
-            <a:endParaRPr lang="sk-SK"/>
           </a:p>
         </p:txBody>
       </p:sp>
@@ -456,7 +472,7 @@
           <a:p>
             <a:fld id="{071090A5-4B13-4620-ADE1-3276C2D13370}" type="datetimeFigureOut">
               <a:rPr lang="sk-SK" smtClean="0"/>
-              <a:t>11. 10. 2016</a:t>
+              <a:t>11.10.2016</a:t>
             </a:fld>
             <a:endParaRPr lang="sk-SK"/>
           </a:p>
@@ -550,10 +566,9 @@
           <a:lstStyle/>
           <a:p>
             <a:r>
-              <a:rPr lang="sk-SK" smtClean="0"/>
+              <a:rPr lang="sk-SK"/>
               <a:t>Kliknite sem a upravte štýl predlohy nadpisov.</a:t>
             </a:r>
-            <a:endParaRPr lang="sk-SK"/>
           </a:p>
         </p:txBody>
       </p:sp>
@@ -579,38 +594,37 @@
           <a:p>
             <a:pPr lvl="0"/>
             <a:r>
-              <a:rPr lang="sk-SK" smtClean="0"/>
+              <a:rPr lang="sk-SK"/>
               <a:t>Kliknite sem a upravte štýly predlohy textu.</a:t>
             </a:r>
           </a:p>
           <a:p>
             <a:pPr lvl="1"/>
             <a:r>
-              <a:rPr lang="sk-SK" smtClean="0"/>
+              <a:rPr lang="sk-SK"/>
               <a:t>Druhá úroveň</a:t>
             </a:r>
           </a:p>
           <a:p>
             <a:pPr lvl="2"/>
             <a:r>
-              <a:rPr lang="sk-SK" smtClean="0"/>
+              <a:rPr lang="sk-SK"/>
               <a:t>Tretia úroveň</a:t>
             </a:r>
           </a:p>
           <a:p>
             <a:pPr lvl="3"/>
             <a:r>
-              <a:rPr lang="sk-SK" smtClean="0"/>
+              <a:rPr lang="sk-SK"/>
               <a:t>Štvrtá úroveň</a:t>
             </a:r>
           </a:p>
           <a:p>
             <a:pPr lvl="4"/>
             <a:r>
-              <a:rPr lang="sk-SK" smtClean="0"/>
+              <a:rPr lang="sk-SK"/>
               <a:t>Piata úroveň</a:t>
             </a:r>
-            <a:endParaRPr lang="sk-SK"/>
           </a:p>
         </p:txBody>
       </p:sp>
@@ -631,7 +645,7 @@
           <a:p>
             <a:fld id="{071090A5-4B13-4620-ADE1-3276C2D13370}" type="datetimeFigureOut">
               <a:rPr lang="sk-SK" smtClean="0"/>
-              <a:t>11. 10. 2016</a:t>
+              <a:t>11.10.2016</a:t>
             </a:fld>
             <a:endParaRPr lang="sk-SK"/>
           </a:p>
@@ -720,10 +734,9 @@
           <a:lstStyle/>
           <a:p>
             <a:r>
-              <a:rPr lang="sk-SK" smtClean="0"/>
+              <a:rPr lang="sk-SK"/>
               <a:t>Kliknite sem a upravte štýl predlohy nadpisov.</a:t>
             </a:r>
-            <a:endParaRPr lang="sk-SK"/>
           </a:p>
         </p:txBody>
       </p:sp>
@@ -744,38 +757,37 @@
           <a:p>
             <a:pPr lvl="0"/>
             <a:r>
-              <a:rPr lang="sk-SK" smtClean="0"/>
+              <a:rPr lang="sk-SK"/>
               <a:t>Kliknite sem a upravte štýly predlohy textu.</a:t>
             </a:r>
           </a:p>
           <a:p>
             <a:pPr lvl="1"/>
             <a:r>
-              <a:rPr lang="sk-SK" smtClean="0"/>
+              <a:rPr lang="sk-SK"/>
               <a:t>Druhá úroveň</a:t>
             </a:r>
           </a:p>
           <a:p>
             <a:pPr lvl="2"/>
             <a:r>
-              <a:rPr lang="sk-SK" smtClean="0"/>
+              <a:rPr lang="sk-SK"/>
               <a:t>Tretia úroveň</a:t>
             </a:r>
           </a:p>
           <a:p>
             <a:pPr lvl="3"/>
             <a:r>
-              <a:rPr lang="sk-SK" smtClean="0"/>
+              <a:rPr lang="sk-SK"/>
               <a:t>Štvrtá úroveň</a:t>
             </a:r>
           </a:p>
           <a:p>
             <a:pPr lvl="4"/>
             <a:r>
-              <a:rPr lang="sk-SK" smtClean="0"/>
+              <a:rPr lang="sk-SK"/>
               <a:t>Piata úroveň</a:t>
             </a:r>
-            <a:endParaRPr lang="sk-SK"/>
           </a:p>
         </p:txBody>
       </p:sp>
@@ -796,7 +808,7 @@
           <a:p>
             <a:fld id="{071090A5-4B13-4620-ADE1-3276C2D13370}" type="datetimeFigureOut">
               <a:rPr lang="sk-SK" smtClean="0"/>
-              <a:t>11. 10. 2016</a:t>
+              <a:t>11.10.2016</a:t>
             </a:fld>
             <a:endParaRPr lang="sk-SK"/>
           </a:p>
@@ -894,10 +906,9 @@
           </a:lstStyle>
           <a:p>
             <a:r>
-              <a:rPr lang="sk-SK" smtClean="0"/>
+              <a:rPr lang="sk-SK"/>
               <a:t>Kliknite sem a upravte štýl predlohy nadpisov.</a:t>
             </a:r>
-            <a:endParaRPr lang="sk-SK"/>
           </a:p>
         </p:txBody>
       </p:sp>
@@ -1014,7 +1025,7 @@
           <a:p>
             <a:pPr lvl="0"/>
             <a:r>
-              <a:rPr lang="sk-SK" smtClean="0"/>
+              <a:rPr lang="sk-SK"/>
               <a:t>Kliknite sem a upravte štýly predlohy textu.</a:t>
             </a:r>
           </a:p>
@@ -1037,7 +1048,7 @@
           <a:p>
             <a:fld id="{071090A5-4B13-4620-ADE1-3276C2D13370}" type="datetimeFigureOut">
               <a:rPr lang="sk-SK" smtClean="0"/>
-              <a:t>11. 10. 2016</a:t>
+              <a:t>11.10.2016</a:t>
             </a:fld>
             <a:endParaRPr lang="sk-SK"/>
           </a:p>
@@ -1126,10 +1137,9 @@
           <a:lstStyle/>
           <a:p>
             <a:r>
-              <a:rPr lang="sk-SK" smtClean="0"/>
+              <a:rPr lang="sk-SK"/>
               <a:t>Kliknite sem a upravte štýl predlohy nadpisov.</a:t>
             </a:r>
-            <a:endParaRPr lang="sk-SK"/>
           </a:p>
         </p:txBody>
       </p:sp>
@@ -1183,38 +1193,37 @@
           <a:p>
             <a:pPr lvl="0"/>
             <a:r>
-              <a:rPr lang="sk-SK" smtClean="0"/>
+              <a:rPr lang="sk-SK"/>
               <a:t>Kliknite sem a upravte štýly predlohy textu.</a:t>
             </a:r>
           </a:p>
           <a:p>
             <a:pPr lvl="1"/>
             <a:r>
-              <a:rPr lang="sk-SK" smtClean="0"/>
+              <a:rPr lang="sk-SK"/>
               <a:t>Druhá úroveň</a:t>
             </a:r>
           </a:p>
           <a:p>
             <a:pPr lvl="2"/>
             <a:r>
-              <a:rPr lang="sk-SK" smtClean="0"/>
+              <a:rPr lang="sk-SK"/>
               <a:t>Tretia úroveň</a:t>
             </a:r>
           </a:p>
           <a:p>
             <a:pPr lvl="3"/>
             <a:r>
-              <a:rPr lang="sk-SK" smtClean="0"/>
+              <a:rPr lang="sk-SK"/>
               <a:t>Štvrtá úroveň</a:t>
             </a:r>
           </a:p>
           <a:p>
             <a:pPr lvl="4"/>
             <a:r>
-              <a:rPr lang="sk-SK" smtClean="0"/>
+              <a:rPr lang="sk-SK"/>
               <a:t>Piata úroveň</a:t>
             </a:r>
-            <a:endParaRPr lang="sk-SK"/>
           </a:p>
         </p:txBody>
       </p:sp>
@@ -1268,38 +1277,37 @@
           <a:p>
             <a:pPr lvl="0"/>
             <a:r>
-              <a:rPr lang="sk-SK" smtClean="0"/>
+              <a:rPr lang="sk-SK"/>
               <a:t>Kliknite sem a upravte štýly predlohy textu.</a:t>
             </a:r>
           </a:p>
           <a:p>
             <a:pPr lvl="1"/>
             <a:r>
-              <a:rPr lang="sk-SK" smtClean="0"/>
+              <a:rPr lang="sk-SK"/>
               <a:t>Druhá úroveň</a:t>
             </a:r>
           </a:p>
           <a:p>
             <a:pPr lvl="2"/>
             <a:r>
-              <a:rPr lang="sk-SK" smtClean="0"/>
+              <a:rPr lang="sk-SK"/>
               <a:t>Tretia úroveň</a:t>
             </a:r>
           </a:p>
           <a:p>
             <a:pPr lvl="3"/>
             <a:r>
-              <a:rPr lang="sk-SK" smtClean="0"/>
+              <a:rPr lang="sk-SK"/>
               <a:t>Štvrtá úroveň</a:t>
             </a:r>
           </a:p>
           <a:p>
             <a:pPr lvl="4"/>
             <a:r>
-              <a:rPr lang="sk-SK" smtClean="0"/>
+              <a:rPr lang="sk-SK"/>
               <a:t>Piata úroveň</a:t>
             </a:r>
-            <a:endParaRPr lang="sk-SK"/>
           </a:p>
         </p:txBody>
       </p:sp>
@@ -1320,7 +1328,7 @@
           <a:p>
             <a:fld id="{071090A5-4B13-4620-ADE1-3276C2D13370}" type="datetimeFigureOut">
               <a:rPr lang="sk-SK" smtClean="0"/>
-              <a:t>11. 10. 2016</a:t>
+              <a:t>11.10.2016</a:t>
             </a:fld>
             <a:endParaRPr lang="sk-SK"/>
           </a:p>
@@ -1413,10 +1421,9 @@
           </a:lstStyle>
           <a:p>
             <a:r>
-              <a:rPr lang="sk-SK" smtClean="0"/>
+              <a:rPr lang="sk-SK"/>
               <a:t>Kliknite sem a upravte štýl predlohy nadpisov.</a:t>
             </a:r>
-            <a:endParaRPr lang="sk-SK"/>
           </a:p>
         </p:txBody>
       </p:sp>
@@ -1479,7 +1486,7 @@
           <a:p>
             <a:pPr lvl="0"/>
             <a:r>
-              <a:rPr lang="sk-SK" smtClean="0"/>
+              <a:rPr lang="sk-SK"/>
               <a:t>Kliknite sem a upravte štýly predlohy textu.</a:t>
             </a:r>
           </a:p>
@@ -1535,38 +1542,37 @@
           <a:p>
             <a:pPr lvl="0"/>
             <a:r>
-              <a:rPr lang="sk-SK" smtClean="0"/>
+              <a:rPr lang="sk-SK"/>
               <a:t>Kliknite sem a upravte štýly predlohy textu.</a:t>
             </a:r>
           </a:p>
           <a:p>
             <a:pPr lvl="1"/>
             <a:r>
-              <a:rPr lang="sk-SK" smtClean="0"/>
+              <a:rPr lang="sk-SK"/>
               <a:t>Druhá úroveň</a:t>
             </a:r>
           </a:p>
           <a:p>
             <a:pPr lvl="2"/>
             <a:r>
-              <a:rPr lang="sk-SK" smtClean="0"/>
+              <a:rPr lang="sk-SK"/>
               <a:t>Tretia úroveň</a:t>
             </a:r>
           </a:p>
           <a:p>
             <a:pPr lvl="3"/>
             <a:r>
-              <a:rPr lang="sk-SK" smtClean="0"/>
+              <a:rPr lang="sk-SK"/>
               <a:t>Štvrtá úroveň</a:t>
             </a:r>
           </a:p>
           <a:p>
             <a:pPr lvl="4"/>
             <a:r>
-              <a:rPr lang="sk-SK" smtClean="0"/>
+              <a:rPr lang="sk-SK"/>
               <a:t>Piata úroveň</a:t>
             </a:r>
-            <a:endParaRPr lang="sk-SK"/>
           </a:p>
         </p:txBody>
       </p:sp>
@@ -1629,7 +1635,7 @@
           <a:p>
             <a:pPr lvl="0"/>
             <a:r>
-              <a:rPr lang="sk-SK" smtClean="0"/>
+              <a:rPr lang="sk-SK"/>
               <a:t>Kliknite sem a upravte štýly predlohy textu.</a:t>
             </a:r>
           </a:p>
@@ -1685,38 +1691,37 @@
           <a:p>
             <a:pPr lvl="0"/>
             <a:r>
-              <a:rPr lang="sk-SK" smtClean="0"/>
+              <a:rPr lang="sk-SK"/>
               <a:t>Kliknite sem a upravte štýly predlohy textu.</a:t>
             </a:r>
           </a:p>
           <a:p>
             <a:pPr lvl="1"/>
             <a:r>
-              <a:rPr lang="sk-SK" smtClean="0"/>
+              <a:rPr lang="sk-SK"/>
               <a:t>Druhá úroveň</a:t>
             </a:r>
           </a:p>
           <a:p>
             <a:pPr lvl="2"/>
             <a:r>
-              <a:rPr lang="sk-SK" smtClean="0"/>
+              <a:rPr lang="sk-SK"/>
               <a:t>Tretia úroveň</a:t>
             </a:r>
           </a:p>
           <a:p>
             <a:pPr lvl="3"/>
             <a:r>
-              <a:rPr lang="sk-SK" smtClean="0"/>
+              <a:rPr lang="sk-SK"/>
               <a:t>Štvrtá úroveň</a:t>
             </a:r>
           </a:p>
           <a:p>
             <a:pPr lvl="4"/>
             <a:r>
-              <a:rPr lang="sk-SK" smtClean="0"/>
+              <a:rPr lang="sk-SK"/>
               <a:t>Piata úroveň</a:t>
             </a:r>
-            <a:endParaRPr lang="sk-SK"/>
           </a:p>
         </p:txBody>
       </p:sp>
@@ -1737,7 +1742,7 @@
           <a:p>
             <a:fld id="{071090A5-4B13-4620-ADE1-3276C2D13370}" type="datetimeFigureOut">
               <a:rPr lang="sk-SK" smtClean="0"/>
-              <a:t>11. 10. 2016</a:t>
+              <a:t>11.10.2016</a:t>
             </a:fld>
             <a:endParaRPr lang="sk-SK"/>
           </a:p>
@@ -1826,10 +1831,9 @@
           <a:lstStyle/>
           <a:p>
             <a:r>
-              <a:rPr lang="sk-SK" smtClean="0"/>
+              <a:rPr lang="sk-SK"/>
               <a:t>Kliknite sem a upravte štýl predlohy nadpisov.</a:t>
             </a:r>
-            <a:endParaRPr lang="sk-SK"/>
           </a:p>
         </p:txBody>
       </p:sp>
@@ -1850,7 +1854,7 @@
           <a:p>
             <a:fld id="{071090A5-4B13-4620-ADE1-3276C2D13370}" type="datetimeFigureOut">
               <a:rPr lang="sk-SK" smtClean="0"/>
-              <a:t>11. 10. 2016</a:t>
+              <a:t>11.10.2016</a:t>
             </a:fld>
             <a:endParaRPr lang="sk-SK"/>
           </a:p>
@@ -1940,7 +1944,7 @@
           <a:p>
             <a:fld id="{071090A5-4B13-4620-ADE1-3276C2D13370}" type="datetimeFigureOut">
               <a:rPr lang="sk-SK" smtClean="0"/>
-              <a:t>11. 10. 2016</a:t>
+              <a:t>11.10.2016</a:t>
             </a:fld>
             <a:endParaRPr lang="sk-SK"/>
           </a:p>
@@ -2038,10 +2042,9 @@
           </a:lstStyle>
           <a:p>
             <a:r>
-              <a:rPr lang="sk-SK" smtClean="0"/>
+              <a:rPr lang="sk-SK"/>
               <a:t>Kliknite sem a upravte štýl predlohy nadpisov.</a:t>
             </a:r>
-            <a:endParaRPr lang="sk-SK"/>
           </a:p>
         </p:txBody>
       </p:sp>
@@ -2095,38 +2098,37 @@
           <a:p>
             <a:pPr lvl="0"/>
             <a:r>
-              <a:rPr lang="sk-SK" smtClean="0"/>
+              <a:rPr lang="sk-SK"/>
               <a:t>Kliknite sem a upravte štýly predlohy textu.</a:t>
             </a:r>
           </a:p>
           <a:p>
             <a:pPr lvl="1"/>
             <a:r>
-              <a:rPr lang="sk-SK" smtClean="0"/>
+              <a:rPr lang="sk-SK"/>
               <a:t>Druhá úroveň</a:t>
             </a:r>
           </a:p>
           <a:p>
             <a:pPr lvl="2"/>
             <a:r>
-              <a:rPr lang="sk-SK" smtClean="0"/>
+              <a:rPr lang="sk-SK"/>
               <a:t>Tretia úroveň</a:t>
             </a:r>
           </a:p>
           <a:p>
             <a:pPr lvl="3"/>
             <a:r>
-              <a:rPr lang="sk-SK" smtClean="0"/>
+              <a:rPr lang="sk-SK"/>
               <a:t>Štvrtá úroveň</a:t>
             </a:r>
           </a:p>
           <a:p>
             <a:pPr lvl="4"/>
             <a:r>
-              <a:rPr lang="sk-SK" smtClean="0"/>
+              <a:rPr lang="sk-SK"/>
               <a:t>Piata úroveň</a:t>
             </a:r>
-            <a:endParaRPr lang="sk-SK"/>
           </a:p>
         </p:txBody>
       </p:sp>
@@ -2189,7 +2191,7 @@
           <a:p>
             <a:pPr lvl="0"/>
             <a:r>
-              <a:rPr lang="sk-SK" smtClean="0"/>
+              <a:rPr lang="sk-SK"/>
               <a:t>Kliknite sem a upravte štýly predlohy textu.</a:t>
             </a:r>
           </a:p>
@@ -2212,7 +2214,7 @@
           <a:p>
             <a:fld id="{071090A5-4B13-4620-ADE1-3276C2D13370}" type="datetimeFigureOut">
               <a:rPr lang="sk-SK" smtClean="0"/>
-              <a:t>11. 10. 2016</a:t>
+              <a:t>11.10.2016</a:t>
             </a:fld>
             <a:endParaRPr lang="sk-SK"/>
           </a:p>
@@ -2310,10 +2312,9 @@
           </a:lstStyle>
           <a:p>
             <a:r>
-              <a:rPr lang="sk-SK" smtClean="0"/>
+              <a:rPr lang="sk-SK"/>
               <a:t>Kliknite sem a upravte štýl predlohy nadpisov.</a:t>
             </a:r>
-            <a:endParaRPr lang="sk-SK"/>
           </a:p>
         </p:txBody>
       </p:sp>
@@ -2437,7 +2438,7 @@
           <a:p>
             <a:pPr lvl="0"/>
             <a:r>
-              <a:rPr lang="sk-SK" smtClean="0"/>
+              <a:rPr lang="sk-SK"/>
               <a:t>Kliknite sem a upravte štýly predlohy textu.</a:t>
             </a:r>
           </a:p>
@@ -2460,7 +2461,7 @@
           <a:p>
             <a:fld id="{071090A5-4B13-4620-ADE1-3276C2D13370}" type="datetimeFigureOut">
               <a:rPr lang="sk-SK" smtClean="0"/>
-              <a:t>11. 10. 2016</a:t>
+              <a:t>11.10.2016</a:t>
             </a:fld>
             <a:endParaRPr lang="sk-SK"/>
           </a:p>
@@ -2564,10 +2565,9 @@
           <a:lstStyle/>
           <a:p>
             <a:r>
-              <a:rPr lang="sk-SK" smtClean="0"/>
+              <a:rPr lang="sk-SK"/>
               <a:t>Kliknite sem a upravte štýl predlohy nadpisov.</a:t>
             </a:r>
-            <a:endParaRPr lang="sk-SK"/>
           </a:p>
         </p:txBody>
       </p:sp>
@@ -2598,38 +2598,37 @@
           <a:p>
             <a:pPr lvl="0"/>
             <a:r>
-              <a:rPr lang="sk-SK" smtClean="0"/>
+              <a:rPr lang="sk-SK"/>
               <a:t>Kliknite sem a upravte štýly predlohy textu.</a:t>
             </a:r>
           </a:p>
           <a:p>
             <a:pPr lvl="1"/>
             <a:r>
-              <a:rPr lang="sk-SK" smtClean="0"/>
+              <a:rPr lang="sk-SK"/>
               <a:t>Druhá úroveň</a:t>
             </a:r>
           </a:p>
           <a:p>
             <a:pPr lvl="2"/>
             <a:r>
-              <a:rPr lang="sk-SK" smtClean="0"/>
+              <a:rPr lang="sk-SK"/>
               <a:t>Tretia úroveň</a:t>
             </a:r>
           </a:p>
           <a:p>
             <a:pPr lvl="3"/>
             <a:r>
-              <a:rPr lang="sk-SK" smtClean="0"/>
+              <a:rPr lang="sk-SK"/>
               <a:t>Štvrtá úroveň</a:t>
             </a:r>
           </a:p>
           <a:p>
             <a:pPr lvl="4"/>
             <a:r>
-              <a:rPr lang="sk-SK" smtClean="0"/>
+              <a:rPr lang="sk-SK"/>
               <a:t>Piata úroveň</a:t>
             </a:r>
-            <a:endParaRPr lang="sk-SK"/>
           </a:p>
         </p:txBody>
       </p:sp>
@@ -2668,7 +2667,7 @@
           <a:p>
             <a:fld id="{071090A5-4B13-4620-ADE1-3276C2D13370}" type="datetimeFigureOut">
               <a:rPr lang="sk-SK" smtClean="0"/>
-              <a:t>11. 10. 2016</a:t>
+              <a:t>11.10.2016</a:t>
             </a:fld>
             <a:endParaRPr lang="sk-SK"/>
           </a:p>
@@ -3054,11 +3053,11 @@
           <a:lstStyle/>
           <a:p>
             <a:r>
-              <a:rPr lang="sk-SK" dirty="0" smtClean="0"/>
+              <a:rPr lang="sk-SK" dirty="0"/>
               <a:t>TLS </a:t>
             </a:r>
             <a:r>
-              <a:rPr lang="sk-SK" dirty="0" err="1" smtClean="0"/>
+              <a:rPr lang="sk-SK" dirty="0" err="1"/>
               <a:t>Parser</a:t>
             </a:r>
             <a:endParaRPr lang="sk-SK" dirty="0"/>
@@ -3087,18 +3086,18 @@
           <a:p>
             <a:pPr algn="l"/>
             <a:r>
-              <a:rPr lang="sk-SK" dirty="0" smtClean="0"/>
+              <a:rPr lang="sk-SK" dirty="0"/>
               <a:t>PA</a:t>
             </a:r>
             <a:r>
-              <a:rPr lang="en-US" dirty="0" smtClean="0"/>
+              <a:rPr lang="en-US" dirty="0"/>
               <a:t>193 – Project</a:t>
             </a:r>
           </a:p>
           <a:p>
             <a:pPr algn="l"/>
             <a:r>
-              <a:rPr lang="en-US" dirty="0" smtClean="0"/>
+              <a:rPr lang="en-US" dirty="0"/>
               <a:t>2016</a:t>
             </a:r>
           </a:p>
@@ -3145,7 +3144,7 @@
           <a:lstStyle/>
           <a:p>
             <a:r>
-              <a:rPr lang="en-US" dirty="0" smtClean="0"/>
+              <a:rPr lang="en-US" dirty="0"/>
               <a:t>Scope</a:t>
             </a:r>
             <a:endParaRPr lang="sk-SK" dirty="0"/>
@@ -3168,24 +3167,24 @@
           <a:lstStyle/>
           <a:p>
             <a:r>
-              <a:rPr lang="en-US" dirty="0" smtClean="0"/>
+              <a:rPr lang="en-US" dirty="0"/>
               <a:t>TLSv1.0 – TLSv1.2</a:t>
             </a:r>
           </a:p>
           <a:p>
             <a:r>
-              <a:rPr lang="en-US" dirty="0" smtClean="0"/>
+              <a:rPr lang="en-US" dirty="0"/>
               <a:t>Record protocol + Handshake protocol</a:t>
             </a:r>
           </a:p>
           <a:p>
             <a:pPr lvl="1"/>
             <a:r>
-              <a:rPr lang="en-US" dirty="0" smtClean="0"/>
+              <a:rPr lang="en-US" dirty="0"/>
               <a:t>Client/</a:t>
             </a:r>
             <a:r>
-              <a:rPr lang="en-US" dirty="0" err="1" smtClean="0"/>
+              <a:rPr lang="en-US" dirty="0" err="1"/>
               <a:t>ServerHello</a:t>
             </a:r>
             <a:endParaRPr lang="en-US" dirty="0"/>
@@ -3193,33 +3192,33 @@
           <a:p>
             <a:pPr lvl="1"/>
             <a:r>
-              <a:rPr lang="en-US" dirty="0" smtClean="0"/>
+              <a:rPr lang="en-US" dirty="0"/>
               <a:t>Certificate</a:t>
             </a:r>
           </a:p>
           <a:p>
             <a:pPr lvl="1"/>
             <a:r>
-              <a:rPr lang="en-US" dirty="0" smtClean="0"/>
+              <a:rPr lang="en-US" dirty="0"/>
               <a:t>Client/</a:t>
             </a:r>
             <a:r>
-              <a:rPr lang="en-US" dirty="0" err="1" smtClean="0"/>
+              <a:rPr lang="en-US" dirty="0" err="1"/>
               <a:t>ServerKeyExchange</a:t>
             </a:r>
-            <a:endParaRPr lang="en-US" dirty="0" smtClean="0"/>
+            <a:endParaRPr lang="en-US" dirty="0"/>
           </a:p>
           <a:p>
             <a:pPr lvl="1"/>
             <a:r>
-              <a:rPr lang="en-US" dirty="0" err="1" smtClean="0"/>
+              <a:rPr lang="en-US" dirty="0" err="1"/>
               <a:t>ServerHelloDone</a:t>
             </a:r>
-            <a:endParaRPr lang="en-US" dirty="0" smtClean="0"/>
-          </a:p>
-          <a:p>
-            <a:r>
-              <a:rPr lang="en-US" dirty="0" smtClean="0"/>
+            <a:endParaRPr lang="en-US" dirty="0"/>
+          </a:p>
+          <a:p>
+            <a:r>
+              <a:rPr lang="en-US" dirty="0"/>
               <a:t>Binary format (see RFC 5246)</a:t>
             </a:r>
           </a:p>
@@ -3270,7 +3269,7 @@
           <a:lstStyle/>
           <a:p>
             <a:r>
-              <a:rPr lang="en-US" dirty="0" smtClean="0"/>
+              <a:rPr lang="en-US" dirty="0"/>
               <a:t>Overall Design</a:t>
             </a:r>
             <a:endParaRPr lang="sk-SK" dirty="0"/>
@@ -3293,27 +3292,27 @@
           <a:lstStyle/>
           <a:p>
             <a:r>
-              <a:rPr lang="en-US" dirty="0" smtClean="0"/>
+              <a:rPr lang="en-US" dirty="0"/>
               <a:t>Parser processes input and builds a </a:t>
             </a:r>
             <a:r>
-              <a:rPr lang="en-US" i="1" dirty="0" err="1" smtClean="0"/>
+              <a:rPr lang="en-US" i="1" dirty="0" err="1"/>
               <a:t>HandshakeMessage</a:t>
             </a:r>
             <a:r>
-              <a:rPr lang="en-US" dirty="0" smtClean="0"/>
+              <a:rPr lang="en-US" dirty="0"/>
               <a:t> structure</a:t>
             </a:r>
           </a:p>
           <a:p>
             <a:r>
-              <a:rPr lang="en-US" dirty="0" smtClean="0"/>
+              <a:rPr lang="en-US" dirty="0"/>
               <a:t>Record layer protocol headers -&gt; Handshake protocol headers -&gt; Handshake message</a:t>
             </a:r>
           </a:p>
           <a:p>
             <a:r>
-              <a:rPr lang="en-US" dirty="0" smtClean="0"/>
+              <a:rPr lang="en-US" dirty="0"/>
               <a:t>Parsed values are printed on standard output</a:t>
             </a:r>
           </a:p>
@@ -3322,7 +3321,7 @@
           </a:p>
           <a:p>
             <a:r>
-              <a:rPr lang="en-US" dirty="0" smtClean="0"/>
+              <a:rPr lang="en-US" dirty="0"/>
               <a:t>For example of usage see README.md </a:t>
             </a:r>
           </a:p>
@@ -3379,125 +3378,125 @@
               <a:buNone/>
             </a:pPr>
             <a:r>
-              <a:rPr lang="sk-SK" sz="1800" dirty="0" smtClean="0">
+              <a:rPr lang="sk-SK" sz="1800" dirty="0">
                 <a:latin typeface="Consolas" pitchFamily="49" charset="0"/>
                 <a:cs typeface="Consolas" pitchFamily="49" charset="0"/>
               </a:rPr>
               <a:t>// </a:t>
             </a:r>
             <a:r>
-              <a:rPr lang="sk-SK" sz="1800" dirty="0" err="1" smtClean="0">
+              <a:rPr lang="sk-SK" sz="1800" dirty="0" err="1">
                 <a:latin typeface="Consolas" pitchFamily="49" charset="0"/>
                 <a:cs typeface="Consolas" pitchFamily="49" charset="0"/>
               </a:rPr>
               <a:t>This</a:t>
             </a:r>
             <a:r>
-              <a:rPr lang="sk-SK" sz="1800" dirty="0" smtClean="0">
+              <a:rPr lang="sk-SK" sz="1800" dirty="0">
                 <a:latin typeface="Consolas" pitchFamily="49" charset="0"/>
                 <a:cs typeface="Consolas" pitchFamily="49" charset="0"/>
               </a:rPr>
               <a:t> </a:t>
             </a:r>
             <a:r>
-              <a:rPr lang="sk-SK" sz="1800" dirty="0" err="1" smtClean="0">
+              <a:rPr lang="sk-SK" sz="1800" dirty="0" err="1">
                 <a:latin typeface="Consolas" pitchFamily="49" charset="0"/>
                 <a:cs typeface="Consolas" pitchFamily="49" charset="0"/>
               </a:rPr>
               <a:t>is</a:t>
             </a:r>
             <a:r>
-              <a:rPr lang="sk-SK" sz="1800" dirty="0" smtClean="0">
+              <a:rPr lang="sk-SK" sz="1800" dirty="0">
                 <a:latin typeface="Consolas" pitchFamily="49" charset="0"/>
                 <a:cs typeface="Consolas" pitchFamily="49" charset="0"/>
               </a:rPr>
               <a:t> </a:t>
             </a:r>
             <a:r>
-              <a:rPr lang="sk-SK" sz="1800" dirty="0" err="1" smtClean="0">
+              <a:rPr lang="sk-SK" sz="1800" dirty="0" err="1">
                 <a:latin typeface="Consolas" pitchFamily="49" charset="0"/>
                 <a:cs typeface="Consolas" pitchFamily="49" charset="0"/>
               </a:rPr>
               <a:t>how</a:t>
             </a:r>
             <a:r>
-              <a:rPr lang="sk-SK" sz="1800" dirty="0" smtClean="0">
+              <a:rPr lang="sk-SK" sz="1800" dirty="0">
                 <a:latin typeface="Consolas" pitchFamily="49" charset="0"/>
                 <a:cs typeface="Consolas" pitchFamily="49" charset="0"/>
               </a:rPr>
               <a:t> </a:t>
             </a:r>
             <a:r>
-              <a:rPr lang="sk-SK" sz="1800" dirty="0" err="1" smtClean="0">
+              <a:rPr lang="sk-SK" sz="1800" dirty="0" err="1">
                 <a:latin typeface="Consolas" pitchFamily="49" charset="0"/>
                 <a:cs typeface="Consolas" pitchFamily="49" charset="0"/>
               </a:rPr>
               <a:t>the</a:t>
             </a:r>
             <a:r>
-              <a:rPr lang="sk-SK" sz="1800" dirty="0" smtClean="0">
+              <a:rPr lang="sk-SK" sz="1800" dirty="0">
                 <a:latin typeface="Consolas" pitchFamily="49" charset="0"/>
                 <a:cs typeface="Consolas" pitchFamily="49" charset="0"/>
               </a:rPr>
               <a:t> </a:t>
             </a:r>
             <a:r>
-              <a:rPr lang="sk-SK" sz="1800" dirty="0" err="1" smtClean="0">
+              <a:rPr lang="sk-SK" sz="1800" dirty="0" err="1">
                 <a:latin typeface="Consolas" pitchFamily="49" charset="0"/>
                 <a:cs typeface="Consolas" pitchFamily="49" charset="0"/>
               </a:rPr>
               <a:t>message</a:t>
             </a:r>
             <a:r>
-              <a:rPr lang="sk-SK" sz="1800" dirty="0" smtClean="0">
+              <a:rPr lang="sk-SK" sz="1800" dirty="0">
                 <a:latin typeface="Consolas" pitchFamily="49" charset="0"/>
                 <a:cs typeface="Consolas" pitchFamily="49" charset="0"/>
               </a:rPr>
               <a:t> </a:t>
             </a:r>
             <a:r>
-              <a:rPr lang="sk-SK" sz="1800" dirty="0" err="1" smtClean="0">
+              <a:rPr lang="sk-SK" sz="1800" dirty="0" err="1">
                 <a:latin typeface="Consolas" pitchFamily="49" charset="0"/>
                 <a:cs typeface="Consolas" pitchFamily="49" charset="0"/>
               </a:rPr>
               <a:t>looks</a:t>
             </a:r>
             <a:r>
-              <a:rPr lang="sk-SK" sz="1800" dirty="0" smtClean="0">
+              <a:rPr lang="sk-SK" sz="1800" dirty="0">
                 <a:latin typeface="Consolas" pitchFamily="49" charset="0"/>
                 <a:cs typeface="Consolas" pitchFamily="49" charset="0"/>
               </a:rPr>
               <a:t> </a:t>
             </a:r>
             <a:r>
-              <a:rPr lang="sk-SK" sz="1800" dirty="0" err="1" smtClean="0">
+              <a:rPr lang="sk-SK" sz="1800" dirty="0" err="1">
                 <a:latin typeface="Consolas" pitchFamily="49" charset="0"/>
                 <a:cs typeface="Consolas" pitchFamily="49" charset="0"/>
               </a:rPr>
               <a:t>like</a:t>
             </a:r>
             <a:r>
-              <a:rPr lang="sk-SK" sz="1800" dirty="0" smtClean="0">
+              <a:rPr lang="sk-SK" sz="1800" dirty="0">
                 <a:latin typeface="Consolas" pitchFamily="49" charset="0"/>
                 <a:cs typeface="Consolas" pitchFamily="49" charset="0"/>
               </a:rPr>
               <a:t> </a:t>
             </a:r>
             <a:r>
-              <a:rPr lang="sk-SK" sz="1800" dirty="0" err="1" smtClean="0">
+              <a:rPr lang="sk-SK" sz="1800" dirty="0" err="1">
                 <a:latin typeface="Consolas" pitchFamily="49" charset="0"/>
                 <a:cs typeface="Consolas" pitchFamily="49" charset="0"/>
               </a:rPr>
               <a:t>as</a:t>
             </a:r>
             <a:r>
-              <a:rPr lang="sk-SK" sz="1800" dirty="0" smtClean="0">
+              <a:rPr lang="sk-SK" sz="1800" dirty="0">
                 <a:latin typeface="Consolas" pitchFamily="49" charset="0"/>
                 <a:cs typeface="Consolas" pitchFamily="49" charset="0"/>
               </a:rPr>
               <a:t> </a:t>
             </a:r>
-            <a:endParaRPr lang="en-US" sz="1800" dirty="0" smtClean="0">
+            <a:endParaRPr lang="en-US" sz="1800" dirty="0">
               <a:latin typeface="Consolas" pitchFamily="49" charset="0"/>
               <a:cs typeface="Consolas" pitchFamily="49" charset="0"/>
             </a:endParaRPr>
@@ -3507,56 +3506,56 @@
               <a:buNone/>
             </a:pPr>
             <a:r>
-              <a:rPr lang="en-US" sz="1800" dirty="0" smtClean="0">
+              <a:rPr lang="en-US" sz="1800" dirty="0">
                 <a:latin typeface="Consolas" pitchFamily="49" charset="0"/>
                 <a:cs typeface="Consolas" pitchFamily="49" charset="0"/>
               </a:rPr>
               <a:t>// </a:t>
             </a:r>
             <a:r>
-              <a:rPr lang="sk-SK" sz="1800" dirty="0" smtClean="0">
+              <a:rPr lang="sk-SK" sz="1800" dirty="0">
                 <a:latin typeface="Consolas" pitchFamily="49" charset="0"/>
                 <a:cs typeface="Consolas" pitchFamily="49" charset="0"/>
               </a:rPr>
               <a:t>a </a:t>
             </a:r>
             <a:r>
-              <a:rPr lang="sk-SK" sz="1800" dirty="0" err="1" smtClean="0">
+              <a:rPr lang="sk-SK" sz="1800" dirty="0" err="1">
                 <a:latin typeface="Consolas" pitchFamily="49" charset="0"/>
                 <a:cs typeface="Consolas" pitchFamily="49" charset="0"/>
               </a:rPr>
               <a:t>whole</a:t>
             </a:r>
             <a:r>
-              <a:rPr lang="sk-SK" sz="1800" dirty="0" smtClean="0">
+              <a:rPr lang="sk-SK" sz="1800" dirty="0">
                 <a:latin typeface="Consolas" pitchFamily="49" charset="0"/>
                 <a:cs typeface="Consolas" pitchFamily="49" charset="0"/>
               </a:rPr>
               <a:t> (</a:t>
             </a:r>
             <a:r>
-              <a:rPr lang="sk-SK" sz="1800" dirty="0" err="1" smtClean="0">
+              <a:rPr lang="sk-SK" sz="1800" dirty="0" err="1">
                 <a:latin typeface="Consolas" pitchFamily="49" charset="0"/>
                 <a:cs typeface="Consolas" pitchFamily="49" charset="0"/>
               </a:rPr>
               <a:t>record</a:t>
             </a:r>
             <a:r>
-              <a:rPr lang="sk-SK" sz="1800" dirty="0" smtClean="0">
+              <a:rPr lang="sk-SK" sz="1800" dirty="0">
                 <a:latin typeface="Consolas" pitchFamily="49" charset="0"/>
                 <a:cs typeface="Consolas" pitchFamily="49" charset="0"/>
               </a:rPr>
               <a:t> </a:t>
             </a:r>
             <a:r>
-              <a:rPr lang="sk-SK" sz="1800" dirty="0" err="1" smtClean="0">
+              <a:rPr lang="sk-SK" sz="1800" dirty="0" err="1">
                 <a:latin typeface="Consolas" pitchFamily="49" charset="0"/>
                 <a:cs typeface="Consolas" pitchFamily="49" charset="0"/>
               </a:rPr>
               <a:t>layer</a:t>
             </a:r>
             <a:r>
-              <a:rPr lang="sk-SK" sz="1800" dirty="0" smtClean="0">
+              <a:rPr lang="sk-SK" sz="1800" dirty="0">
                 <a:latin typeface="Consolas" pitchFamily="49" charset="0"/>
                 <a:cs typeface="Consolas" pitchFamily="49" charset="0"/>
               </a:rPr>
@@ -3570,34 +3569,34 @@
               <a:t> </a:t>
             </a:r>
             <a:r>
-              <a:rPr lang="sk-SK" sz="1800" dirty="0" err="1" smtClean="0">
+              <a:rPr lang="sk-SK" sz="1800" dirty="0" err="1">
                 <a:latin typeface="Consolas" pitchFamily="49" charset="0"/>
                 <a:cs typeface="Consolas" pitchFamily="49" charset="0"/>
               </a:rPr>
               <a:t>actual</a:t>
             </a:r>
             <a:r>
-              <a:rPr lang="en-US" sz="1800" dirty="0" smtClean="0">
+              <a:rPr lang="en-US" sz="1800" dirty="0">
                 <a:latin typeface="Consolas" pitchFamily="49" charset="0"/>
                 <a:cs typeface="Consolas" pitchFamily="49" charset="0"/>
               </a:rPr>
               <a:t> </a:t>
             </a:r>
             <a:r>
-              <a:rPr lang="sk-SK" sz="1800" dirty="0" err="1" smtClean="0">
+              <a:rPr lang="sk-SK" sz="1800" dirty="0" err="1">
                 <a:latin typeface="Consolas" pitchFamily="49" charset="0"/>
                 <a:cs typeface="Consolas" pitchFamily="49" charset="0"/>
               </a:rPr>
               <a:t>message</a:t>
             </a:r>
             <a:r>
-              <a:rPr lang="sk-SK" sz="1800" dirty="0" smtClean="0">
+              <a:rPr lang="sk-SK" sz="1800" dirty="0">
                 <a:latin typeface="Consolas" pitchFamily="49" charset="0"/>
                 <a:cs typeface="Consolas" pitchFamily="49" charset="0"/>
               </a:rPr>
               <a:t>)</a:t>
             </a:r>
-            <a:endParaRPr lang="en-US" sz="1800" dirty="0" smtClean="0">
+            <a:endParaRPr lang="en-US" sz="1800" dirty="0">
               <a:latin typeface="Consolas" pitchFamily="49" charset="0"/>
               <a:cs typeface="Consolas" pitchFamily="49" charset="0"/>
             </a:endParaRPr>
@@ -3606,7 +3605,7 @@
             <a:pPr>
               <a:buNone/>
             </a:pPr>
-            <a:endParaRPr lang="sk-SK" sz="1800" dirty="0" smtClean="0">
+            <a:endParaRPr lang="sk-SK" sz="1800" dirty="0">
               <a:latin typeface="Consolas" pitchFamily="49" charset="0"/>
               <a:cs typeface="Consolas" pitchFamily="49" charset="0"/>
             </a:endParaRPr>
@@ -3616,28 +3615,28 @@
               <a:buNone/>
             </a:pPr>
             <a:r>
-              <a:rPr lang="sk-SK" sz="1800" dirty="0" err="1" smtClean="0">
+              <a:rPr lang="sk-SK" sz="1800" dirty="0" err="1">
                 <a:latin typeface="Consolas" pitchFamily="49" charset="0"/>
                 <a:cs typeface="Consolas" pitchFamily="49" charset="0"/>
               </a:rPr>
               <a:t>typedef</a:t>
             </a:r>
             <a:r>
-              <a:rPr lang="sk-SK" sz="1800" dirty="0" smtClean="0">
+              <a:rPr lang="sk-SK" sz="1800" dirty="0">
                 <a:latin typeface="Consolas" pitchFamily="49" charset="0"/>
                 <a:cs typeface="Consolas" pitchFamily="49" charset="0"/>
               </a:rPr>
               <a:t> </a:t>
             </a:r>
             <a:r>
-              <a:rPr lang="sk-SK" sz="1800" dirty="0" err="1" smtClean="0">
+              <a:rPr lang="sk-SK" sz="1800" dirty="0" err="1">
                 <a:latin typeface="Consolas" pitchFamily="49" charset="0"/>
                 <a:cs typeface="Consolas" pitchFamily="49" charset="0"/>
               </a:rPr>
               <a:t>struct</a:t>
             </a:r>
             <a:r>
-              <a:rPr lang="sk-SK" sz="1800" dirty="0" smtClean="0">
+              <a:rPr lang="sk-SK" sz="1800" dirty="0">
                 <a:latin typeface="Consolas" pitchFamily="49" charset="0"/>
                 <a:cs typeface="Consolas" pitchFamily="49" charset="0"/>
               </a:rPr>
@@ -3649,35 +3648,35 @@
               <a:buNone/>
             </a:pPr>
             <a:r>
-              <a:rPr lang="sk-SK" sz="1800" dirty="0" smtClean="0">
+              <a:rPr lang="sk-SK" sz="1800" dirty="0">
                 <a:latin typeface="Consolas" pitchFamily="49" charset="0"/>
                 <a:cs typeface="Consolas" pitchFamily="49" charset="0"/>
               </a:rPr>
               <a:t>    </a:t>
             </a:r>
             <a:r>
-              <a:rPr lang="sk-SK" sz="1800" dirty="0" err="1" smtClean="0">
+              <a:rPr lang="sk-SK" sz="1800" dirty="0" err="1">
                 <a:latin typeface="Consolas" pitchFamily="49" charset="0"/>
                 <a:cs typeface="Consolas" pitchFamily="49" charset="0"/>
               </a:rPr>
               <a:t>ContentType</a:t>
             </a:r>
             <a:r>
-              <a:rPr lang="sk-SK" sz="1800" dirty="0" smtClean="0">
+              <a:rPr lang="sk-SK" sz="1800" dirty="0">
                 <a:latin typeface="Consolas" pitchFamily="49" charset="0"/>
                 <a:cs typeface="Consolas" pitchFamily="49" charset="0"/>
               </a:rPr>
               <a:t> </a:t>
             </a:r>
             <a:r>
-              <a:rPr lang="sk-SK" sz="1800" dirty="0" err="1" smtClean="0">
+              <a:rPr lang="sk-SK" sz="1800" dirty="0" err="1">
                 <a:latin typeface="Consolas" pitchFamily="49" charset="0"/>
                 <a:cs typeface="Consolas" pitchFamily="49" charset="0"/>
               </a:rPr>
               <a:t>cType</a:t>
             </a:r>
             <a:r>
-              <a:rPr lang="sk-SK" sz="1800" dirty="0" smtClean="0">
+              <a:rPr lang="sk-SK" sz="1800" dirty="0">
                 <a:latin typeface="Consolas" pitchFamily="49" charset="0"/>
                 <a:cs typeface="Consolas" pitchFamily="49" charset="0"/>
               </a:rPr>
@@ -3689,35 +3688,35 @@
               <a:buNone/>
             </a:pPr>
             <a:r>
-              <a:rPr lang="sk-SK" sz="1800" dirty="0" smtClean="0">
+              <a:rPr lang="sk-SK" sz="1800" dirty="0">
                 <a:latin typeface="Consolas" pitchFamily="49" charset="0"/>
                 <a:cs typeface="Consolas" pitchFamily="49" charset="0"/>
               </a:rPr>
               <a:t>    </a:t>
             </a:r>
             <a:r>
-              <a:rPr lang="sk-SK" sz="1800" dirty="0" err="1" smtClean="0">
+              <a:rPr lang="sk-SK" sz="1800" dirty="0" err="1">
                 <a:latin typeface="Consolas" pitchFamily="49" charset="0"/>
                 <a:cs typeface="Consolas" pitchFamily="49" charset="0"/>
               </a:rPr>
               <a:t>ProtocolVersion</a:t>
             </a:r>
             <a:r>
-              <a:rPr lang="sk-SK" sz="1800" dirty="0" smtClean="0">
+              <a:rPr lang="sk-SK" sz="1800" dirty="0">
                 <a:latin typeface="Consolas" pitchFamily="49" charset="0"/>
                 <a:cs typeface="Consolas" pitchFamily="49" charset="0"/>
               </a:rPr>
               <a:t> </a:t>
             </a:r>
             <a:r>
-              <a:rPr lang="sk-SK" sz="1800" dirty="0" err="1" smtClean="0">
+              <a:rPr lang="sk-SK" sz="1800" dirty="0" err="1">
                 <a:latin typeface="Consolas" pitchFamily="49" charset="0"/>
                 <a:cs typeface="Consolas" pitchFamily="49" charset="0"/>
               </a:rPr>
               <a:t>version</a:t>
             </a:r>
             <a:r>
-              <a:rPr lang="sk-SK" sz="1800" dirty="0" smtClean="0">
+              <a:rPr lang="sk-SK" sz="1800" dirty="0">
                 <a:latin typeface="Consolas" pitchFamily="49" charset="0"/>
                 <a:cs typeface="Consolas" pitchFamily="49" charset="0"/>
               </a:rPr>
@@ -3729,21 +3728,21 @@
               <a:buNone/>
             </a:pPr>
             <a:r>
-              <a:rPr lang="sk-SK" sz="1800" dirty="0" smtClean="0">
+              <a:rPr lang="sk-SK" sz="1800" dirty="0">
                 <a:latin typeface="Consolas" pitchFamily="49" charset="0"/>
                 <a:cs typeface="Consolas" pitchFamily="49" charset="0"/>
               </a:rPr>
               <a:t>    uint16_t </a:t>
             </a:r>
             <a:r>
-              <a:rPr lang="sk-SK" sz="1800" dirty="0" err="1" smtClean="0">
+              <a:rPr lang="sk-SK" sz="1800" dirty="0" err="1">
                 <a:latin typeface="Consolas" pitchFamily="49" charset="0"/>
                 <a:cs typeface="Consolas" pitchFamily="49" charset="0"/>
               </a:rPr>
               <a:t>fLength</a:t>
             </a:r>
             <a:r>
-              <a:rPr lang="sk-SK" sz="1800" dirty="0" smtClean="0">
+              <a:rPr lang="sk-SK" sz="1800" dirty="0">
                 <a:latin typeface="Consolas" pitchFamily="49" charset="0"/>
                 <a:cs typeface="Consolas" pitchFamily="49" charset="0"/>
               </a:rPr>
@@ -3755,35 +3754,35 @@
               <a:buNone/>
             </a:pPr>
             <a:r>
-              <a:rPr lang="sk-SK" sz="1800" dirty="0" smtClean="0">
+              <a:rPr lang="sk-SK" sz="1800" dirty="0">
                 <a:latin typeface="Consolas" pitchFamily="49" charset="0"/>
                 <a:cs typeface="Consolas" pitchFamily="49" charset="0"/>
               </a:rPr>
               <a:t>    </a:t>
             </a:r>
             <a:r>
-              <a:rPr lang="sk-SK" sz="1800" dirty="0" err="1" smtClean="0">
+              <a:rPr lang="sk-SK" sz="1800" dirty="0" err="1">
                 <a:latin typeface="Consolas" pitchFamily="49" charset="0"/>
                 <a:cs typeface="Consolas" pitchFamily="49" charset="0"/>
               </a:rPr>
               <a:t>HandshakeType</a:t>
             </a:r>
             <a:r>
-              <a:rPr lang="sk-SK" sz="1800" dirty="0" smtClean="0">
+              <a:rPr lang="sk-SK" sz="1800" dirty="0">
                 <a:latin typeface="Consolas" pitchFamily="49" charset="0"/>
                 <a:cs typeface="Consolas" pitchFamily="49" charset="0"/>
               </a:rPr>
               <a:t> </a:t>
             </a:r>
             <a:r>
-              <a:rPr lang="sk-SK" sz="1800" dirty="0" err="1" smtClean="0">
+              <a:rPr lang="sk-SK" sz="1800" dirty="0" err="1">
                 <a:latin typeface="Consolas" pitchFamily="49" charset="0"/>
                 <a:cs typeface="Consolas" pitchFamily="49" charset="0"/>
               </a:rPr>
               <a:t>hsType</a:t>
             </a:r>
             <a:r>
-              <a:rPr lang="sk-SK" sz="1800" dirty="0" smtClean="0">
+              <a:rPr lang="sk-SK" sz="1800" dirty="0">
                 <a:latin typeface="Consolas" pitchFamily="49" charset="0"/>
                 <a:cs typeface="Consolas" pitchFamily="49" charset="0"/>
               </a:rPr>
@@ -3795,21 +3794,21 @@
               <a:buNone/>
             </a:pPr>
             <a:r>
-              <a:rPr lang="sk-SK" sz="1800" dirty="0" smtClean="0">
+              <a:rPr lang="sk-SK" sz="1800" dirty="0">
                 <a:latin typeface="Consolas" pitchFamily="49" charset="0"/>
                 <a:cs typeface="Consolas" pitchFamily="49" charset="0"/>
               </a:rPr>
               <a:t>    uint32_t </a:t>
             </a:r>
             <a:r>
-              <a:rPr lang="sk-SK" sz="1800" dirty="0" err="1" smtClean="0">
+              <a:rPr lang="sk-SK" sz="1800" dirty="0" err="1">
                 <a:latin typeface="Consolas" pitchFamily="49" charset="0"/>
                 <a:cs typeface="Consolas" pitchFamily="49" charset="0"/>
               </a:rPr>
               <a:t>mLength</a:t>
             </a:r>
             <a:r>
-              <a:rPr lang="sk-SK" sz="1800" dirty="0" smtClean="0">
+              <a:rPr lang="sk-SK" sz="1800" dirty="0">
                 <a:latin typeface="Consolas" pitchFamily="49" charset="0"/>
                 <a:cs typeface="Consolas" pitchFamily="49" charset="0"/>
               </a:rPr>
@@ -3821,48 +3820,48 @@
               <a:buNone/>
             </a:pPr>
             <a:r>
-              <a:rPr lang="sk-SK" sz="1800" dirty="0" smtClean="0">
+              <a:rPr lang="sk-SK" sz="1800" dirty="0">
                 <a:latin typeface="Consolas" pitchFamily="49" charset="0"/>
                 <a:cs typeface="Consolas" pitchFamily="49" charset="0"/>
               </a:rPr>
               <a:t>    </a:t>
             </a:r>
             <a:r>
-              <a:rPr lang="sk-SK" sz="1800" dirty="0" err="1" smtClean="0">
+              <a:rPr lang="sk-SK" sz="1800" dirty="0" err="1">
                 <a:latin typeface="Consolas" pitchFamily="49" charset="0"/>
                 <a:cs typeface="Consolas" pitchFamily="49" charset="0"/>
               </a:rPr>
               <a:t>unsigned</a:t>
             </a:r>
             <a:r>
-              <a:rPr lang="sk-SK" sz="1800" dirty="0" smtClean="0">
+              <a:rPr lang="sk-SK" sz="1800" dirty="0">
                 <a:latin typeface="Consolas" pitchFamily="49" charset="0"/>
                 <a:cs typeface="Consolas" pitchFamily="49" charset="0"/>
               </a:rPr>
               <a:t> </a:t>
             </a:r>
             <a:r>
-              <a:rPr lang="sk-SK" sz="1800" dirty="0" err="1" smtClean="0">
+              <a:rPr lang="sk-SK" sz="1800" dirty="0" err="1">
                 <a:latin typeface="Consolas" pitchFamily="49" charset="0"/>
                 <a:cs typeface="Consolas" pitchFamily="49" charset="0"/>
               </a:rPr>
               <a:t>char</a:t>
             </a:r>
             <a:r>
-              <a:rPr lang="sk-SK" sz="1800" dirty="0" smtClean="0">
+              <a:rPr lang="sk-SK" sz="1800" dirty="0">
                 <a:latin typeface="Consolas" pitchFamily="49" charset="0"/>
                 <a:cs typeface="Consolas" pitchFamily="49" charset="0"/>
               </a:rPr>
               <a:t> *body;</a:t>
             </a:r>
             <a:r>
-              <a:rPr lang="en-US" sz="1800" dirty="0" smtClean="0">
+              <a:rPr lang="en-US" sz="1800" dirty="0">
                 <a:latin typeface="Consolas" pitchFamily="49" charset="0"/>
                 <a:cs typeface="Consolas" pitchFamily="49" charset="0"/>
               </a:rPr>
               <a:t> // Contains the rest of the message</a:t>
             </a:r>
-            <a:endParaRPr lang="sk-SK" sz="1800" dirty="0" smtClean="0">
+            <a:endParaRPr lang="sk-SK" sz="1800" dirty="0">
               <a:latin typeface="Consolas" pitchFamily="49" charset="0"/>
               <a:cs typeface="Consolas" pitchFamily="49" charset="0"/>
             </a:endParaRPr>
@@ -3872,27 +3871,27 @@
               <a:buNone/>
             </a:pPr>
             <a:r>
-              <a:rPr lang="sk-SK" sz="1800" dirty="0" smtClean="0">
+              <a:rPr lang="sk-SK" sz="1800" dirty="0">
                 <a:latin typeface="Consolas" pitchFamily="49" charset="0"/>
                 <a:cs typeface="Consolas" pitchFamily="49" charset="0"/>
               </a:rPr>
               <a:t>} </a:t>
             </a:r>
             <a:r>
-              <a:rPr lang="sk-SK" sz="1800" dirty="0" err="1" smtClean="0">
+              <a:rPr lang="sk-SK" sz="1800" dirty="0" err="1">
                 <a:latin typeface="Consolas" pitchFamily="49" charset="0"/>
                 <a:cs typeface="Consolas" pitchFamily="49" charset="0"/>
               </a:rPr>
               <a:t>HandshakeMessage</a:t>
             </a:r>
             <a:r>
-              <a:rPr lang="sk-SK" sz="1800" dirty="0" smtClean="0">
+              <a:rPr lang="sk-SK" sz="1800" dirty="0">
                 <a:latin typeface="Consolas" pitchFamily="49" charset="0"/>
                 <a:cs typeface="Consolas" pitchFamily="49" charset="0"/>
               </a:rPr>
               <a:t>;</a:t>
             </a:r>
-            <a:endParaRPr lang="en-US" sz="1800" dirty="0" smtClean="0">
+            <a:endParaRPr lang="en-US" sz="1800" dirty="0">
               <a:latin typeface="Consolas" pitchFamily="49" charset="0"/>
               <a:cs typeface="Consolas" pitchFamily="49" charset="0"/>
             </a:endParaRPr>
@@ -3910,7 +3909,7 @@
             <a:pPr>
               <a:buNone/>
             </a:pPr>
-            <a:endParaRPr lang="en-US" sz="1800" dirty="0" smtClean="0">
+            <a:endParaRPr lang="en-US" sz="1800" dirty="0">
               <a:latin typeface="Consolas" pitchFamily="49" charset="0"/>
               <a:cs typeface="Consolas" pitchFamily="49" charset="0"/>
             </a:endParaRPr>
@@ -3918,6 +3917,530 @@
         </p:txBody>
       </p:sp>
     </p:spTree>
+  </p:cSld>
+  <p:clrMapOvr>
+    <a:masterClrMapping/>
+  </p:clrMapOvr>
+</p:sld>
+</file>
+
+<file path=ppt/slides/slide5.xml><?xml version="1.0" encoding="utf-8"?>
+<p:sld xmlns:a="http://schemas.openxmlformats.org/drawingml/2006/main" xmlns:r="http://schemas.openxmlformats.org/officeDocument/2006/relationships" xmlns:p="http://schemas.openxmlformats.org/presentationml/2006/main">
+  <p:cSld>
+    <p:spTree>
+      <p:nvGrpSpPr>
+        <p:cNvPr id="1" name=""/>
+        <p:cNvGrpSpPr/>
+        <p:nvPr/>
+      </p:nvGrpSpPr>
+      <p:grpSpPr>
+        <a:xfrm>
+          <a:off x="0" y="0"/>
+          <a:ext cx="0" cy="0"/>
+          <a:chOff x="0" y="0"/>
+          <a:chExt cx="0" cy="0"/>
+        </a:xfrm>
+      </p:grpSpPr>
+      <p:sp>
+        <p:nvSpPr>
+          <p:cNvPr id="2" name="Title 1"/>
+          <p:cNvSpPr>
+            <a:spLocks noGrp="1"/>
+          </p:cNvSpPr>
+          <p:nvPr>
+            <p:ph type="title"/>
+          </p:nvPr>
+        </p:nvSpPr>
+        <p:spPr/>
+        <p:txBody>
+          <a:bodyPr/>
+          <a:lstStyle/>
+          <a:p>
+            <a:r>
+              <a:rPr lang="en-US" dirty="0"/>
+              <a:t>Parsing Client Hello	</a:t>
+            </a:r>
+            <a:endParaRPr lang="hi-IN" dirty="0"/>
+          </a:p>
+        </p:txBody>
+      </p:sp>
+      <p:sp>
+        <p:nvSpPr>
+          <p:cNvPr id="3" name="Content Placeholder 2"/>
+          <p:cNvSpPr>
+            <a:spLocks noGrp="1"/>
+          </p:cNvSpPr>
+          <p:nvPr>
+            <p:ph idx="1"/>
+          </p:nvPr>
+        </p:nvSpPr>
+        <p:spPr>
+          <a:xfrm>
+            <a:off x="457200" y="1600200"/>
+            <a:ext cx="8579296" cy="5069160"/>
+          </a:xfrm>
+        </p:spPr>
+        <p:txBody>
+          <a:bodyPr>
+            <a:normAutofit fontScale="85000" lnSpcReduction="10000"/>
+          </a:bodyPr>
+          <a:lstStyle/>
+          <a:p>
+            <a:r>
+              <a:rPr lang="en-US" dirty="0"/>
+              <a:t>Message Length should be at least 38 Bytes </a:t>
+            </a:r>
+          </a:p>
+          <a:p>
+            <a:r>
+              <a:rPr lang="en-US" dirty="0"/>
+              <a:t> First 2 Bytes - Version – 0x03 + 0x01,0x02,0x03</a:t>
+            </a:r>
+          </a:p>
+          <a:p>
+            <a:r>
+              <a:rPr lang="en-US" dirty="0"/>
+              <a:t>4 Bytes time stamp.</a:t>
+            </a:r>
+          </a:p>
+          <a:p>
+            <a:r>
+              <a:rPr lang="en-US" dirty="0"/>
+              <a:t>28 Random Bytes.</a:t>
+            </a:r>
+          </a:p>
+          <a:p>
+            <a:r>
+              <a:rPr lang="en-US" dirty="0"/>
+              <a:t>1 Byte Session id length.</a:t>
+            </a:r>
+          </a:p>
+          <a:p>
+            <a:r>
+              <a:rPr lang="en-US" dirty="0"/>
+              <a:t>Session id – Variable length</a:t>
+            </a:r>
+          </a:p>
+          <a:p>
+            <a:r>
+              <a:rPr lang="en-US" dirty="0"/>
+              <a:t>2 Bytes Cipher Suite length.</a:t>
+            </a:r>
+          </a:p>
+          <a:p>
+            <a:r>
+              <a:rPr lang="en-US" dirty="0"/>
+              <a:t>Cipher Suite Variable length – Not Decoded.</a:t>
+            </a:r>
+          </a:p>
+          <a:p>
+            <a:r>
+              <a:rPr lang="en-US" dirty="0"/>
+              <a:t>1 Bytes – Compression method length</a:t>
+            </a:r>
+          </a:p>
+          <a:p>
+            <a:r>
+              <a:rPr lang="en-US" dirty="0"/>
+              <a:t>Compressions methods one byte per </a:t>
+            </a:r>
+            <a:r>
+              <a:rPr lang="en-US" dirty="0" err="1"/>
+              <a:t>mtd</a:t>
+            </a:r>
+            <a:r>
+              <a:rPr lang="en-US" dirty="0"/>
+              <a:t> – Not decoded.</a:t>
+            </a:r>
+          </a:p>
+          <a:p>
+            <a:r>
+              <a:rPr lang="en-US" dirty="0"/>
+              <a:t>Extensions – if any – checked.</a:t>
+            </a:r>
+          </a:p>
+        </p:txBody>
+      </p:sp>
+    </p:spTree>
+    <p:extLst>
+      <p:ext uri="{BB962C8B-B14F-4D97-AF65-F5344CB8AC3E}">
+        <p14:creationId xmlns:p14="http://schemas.microsoft.com/office/powerpoint/2010/main" val="3518605626"/>
+      </p:ext>
+    </p:extLst>
+  </p:cSld>
+  <p:clrMapOvr>
+    <a:masterClrMapping/>
+  </p:clrMapOvr>
+</p:sld>
+</file>
+
+<file path=ppt/slides/slide6.xml><?xml version="1.0" encoding="utf-8"?>
+<p:sld xmlns:a="http://schemas.openxmlformats.org/drawingml/2006/main" xmlns:r="http://schemas.openxmlformats.org/officeDocument/2006/relationships" xmlns:p="http://schemas.openxmlformats.org/presentationml/2006/main">
+  <p:cSld>
+    <p:spTree>
+      <p:nvGrpSpPr>
+        <p:cNvPr id="1" name=""/>
+        <p:cNvGrpSpPr/>
+        <p:nvPr/>
+      </p:nvGrpSpPr>
+      <p:grpSpPr>
+        <a:xfrm>
+          <a:off x="0" y="0"/>
+          <a:ext cx="0" cy="0"/>
+          <a:chOff x="0" y="0"/>
+          <a:chExt cx="0" cy="0"/>
+        </a:xfrm>
+      </p:grpSpPr>
+      <p:sp>
+        <p:nvSpPr>
+          <p:cNvPr id="2" name="Title 1"/>
+          <p:cNvSpPr>
+            <a:spLocks noGrp="1"/>
+          </p:cNvSpPr>
+          <p:nvPr>
+            <p:ph type="title"/>
+          </p:nvPr>
+        </p:nvSpPr>
+        <p:spPr/>
+        <p:txBody>
+          <a:bodyPr/>
+          <a:lstStyle/>
+          <a:p>
+            <a:r>
+              <a:rPr lang="en-US" dirty="0"/>
+              <a:t>Parsing Server Hello	</a:t>
+            </a:r>
+            <a:endParaRPr lang="hi-IN" dirty="0"/>
+          </a:p>
+        </p:txBody>
+      </p:sp>
+      <p:sp>
+        <p:nvSpPr>
+          <p:cNvPr id="3" name="Content Placeholder 2"/>
+          <p:cNvSpPr>
+            <a:spLocks noGrp="1"/>
+          </p:cNvSpPr>
+          <p:nvPr>
+            <p:ph idx="1"/>
+          </p:nvPr>
+        </p:nvSpPr>
+        <p:spPr/>
+        <p:txBody>
+          <a:bodyPr>
+            <a:normAutofit fontScale="92500" lnSpcReduction="20000"/>
+          </a:bodyPr>
+          <a:lstStyle/>
+          <a:p>
+            <a:r>
+              <a:rPr lang="en-US" dirty="0"/>
+              <a:t>Message Length should be at least 38 Bytes </a:t>
+            </a:r>
+          </a:p>
+          <a:p>
+            <a:r>
+              <a:rPr lang="en-US" dirty="0"/>
+              <a:t> First 2 Bytes - Version – 0x03 + 0x01,0x02,0x03</a:t>
+            </a:r>
+          </a:p>
+          <a:p>
+            <a:r>
+              <a:rPr lang="en-US" dirty="0"/>
+              <a:t>4 Bytes time stamp.</a:t>
+            </a:r>
+          </a:p>
+          <a:p>
+            <a:r>
+              <a:rPr lang="en-US" dirty="0"/>
+              <a:t>28 Random Bytes.</a:t>
+            </a:r>
+          </a:p>
+          <a:p>
+            <a:r>
+              <a:rPr lang="en-US" dirty="0"/>
+              <a:t>1 Byte Session id length.</a:t>
+            </a:r>
+          </a:p>
+          <a:p>
+            <a:r>
+              <a:rPr lang="en-US" dirty="0"/>
+              <a:t>Session id – Variable length</a:t>
+            </a:r>
+          </a:p>
+          <a:p>
+            <a:r>
+              <a:rPr lang="en-US" dirty="0"/>
+              <a:t>2 Bytes Cipher Suite Selected.</a:t>
+            </a:r>
+          </a:p>
+          <a:p>
+            <a:r>
+              <a:rPr lang="en-US" dirty="0"/>
+              <a:t>1 Bytes – Compression method Selected.</a:t>
+            </a:r>
+          </a:p>
+          <a:p>
+            <a:r>
+              <a:rPr lang="en-US" dirty="0"/>
+              <a:t> Extensions – if any – checked.</a:t>
+            </a:r>
+          </a:p>
+          <a:p>
+            <a:endParaRPr lang="hi-IN" dirty="0"/>
+          </a:p>
+        </p:txBody>
+      </p:sp>
+    </p:spTree>
+    <p:extLst>
+      <p:ext uri="{BB962C8B-B14F-4D97-AF65-F5344CB8AC3E}">
+        <p14:creationId xmlns:p14="http://schemas.microsoft.com/office/powerpoint/2010/main" val="512497819"/>
+      </p:ext>
+    </p:extLst>
+  </p:cSld>
+  <p:clrMapOvr>
+    <a:masterClrMapping/>
+  </p:clrMapOvr>
+</p:sld>
+</file>
+
+<file path=ppt/slides/slide7.xml><?xml version="1.0" encoding="utf-8"?>
+<p:sld xmlns:a="http://schemas.openxmlformats.org/drawingml/2006/main" xmlns:r="http://schemas.openxmlformats.org/officeDocument/2006/relationships" xmlns:p="http://schemas.openxmlformats.org/presentationml/2006/main">
+  <p:cSld>
+    <p:spTree>
+      <p:nvGrpSpPr>
+        <p:cNvPr id="1" name=""/>
+        <p:cNvGrpSpPr/>
+        <p:nvPr/>
+      </p:nvGrpSpPr>
+      <p:grpSpPr>
+        <a:xfrm>
+          <a:off x="0" y="0"/>
+          <a:ext cx="0" cy="0"/>
+          <a:chOff x="0" y="0"/>
+          <a:chExt cx="0" cy="0"/>
+        </a:xfrm>
+      </p:grpSpPr>
+      <p:sp>
+        <p:nvSpPr>
+          <p:cNvPr id="2" name="Title 1"/>
+          <p:cNvSpPr>
+            <a:spLocks noGrp="1"/>
+          </p:cNvSpPr>
+          <p:nvPr>
+            <p:ph type="title"/>
+          </p:nvPr>
+        </p:nvSpPr>
+        <p:spPr/>
+        <p:txBody>
+          <a:bodyPr/>
+          <a:lstStyle/>
+          <a:p>
+            <a:r>
+              <a:rPr lang="en-US" dirty="0"/>
+              <a:t>Code Testing	</a:t>
+            </a:r>
+            <a:endParaRPr lang="hi-IN" dirty="0"/>
+          </a:p>
+        </p:txBody>
+      </p:sp>
+      <p:sp>
+        <p:nvSpPr>
+          <p:cNvPr id="3" name="Content Placeholder 2"/>
+          <p:cNvSpPr>
+            <a:spLocks noGrp="1"/>
+          </p:cNvSpPr>
+          <p:nvPr>
+            <p:ph idx="1"/>
+          </p:nvPr>
+        </p:nvSpPr>
+        <p:spPr/>
+        <p:txBody>
+          <a:bodyPr>
+            <a:normAutofit lnSpcReduction="10000"/>
+          </a:bodyPr>
+          <a:lstStyle/>
+          <a:p>
+            <a:r>
+              <a:rPr lang="en-US" dirty="0"/>
+              <a:t>Valid messages for coding were created using Wireshark and </a:t>
+            </a:r>
+            <a:r>
+              <a:rPr lang="en-US" dirty="0" err="1"/>
+              <a:t>ssldump</a:t>
+            </a:r>
+            <a:r>
+              <a:rPr lang="en-US" dirty="0"/>
+              <a:t>.</a:t>
+            </a:r>
+          </a:p>
+          <a:p>
+            <a:r>
+              <a:rPr lang="en-US" dirty="0"/>
+              <a:t>Messages for the following were created:</a:t>
+            </a:r>
+          </a:p>
+          <a:p>
+            <a:pPr lvl="1"/>
+            <a:r>
+              <a:rPr lang="en-US" dirty="0"/>
+              <a:t>Client Hello.</a:t>
+            </a:r>
+          </a:p>
+          <a:p>
+            <a:pPr lvl="1"/>
+            <a:r>
+              <a:rPr lang="en-US" dirty="0"/>
+              <a:t>Server Hello.</a:t>
+            </a:r>
+          </a:p>
+          <a:p>
+            <a:pPr lvl="1"/>
+            <a:r>
+              <a:rPr lang="en-US" dirty="0"/>
+              <a:t>Client Key Exchange</a:t>
+            </a:r>
+          </a:p>
+          <a:p>
+            <a:pPr lvl="1"/>
+            <a:r>
+              <a:rPr lang="en-US" dirty="0"/>
+              <a:t>Certificate</a:t>
+            </a:r>
+          </a:p>
+          <a:p>
+            <a:pPr lvl="1"/>
+            <a:r>
+              <a:rPr lang="en-US" dirty="0"/>
+              <a:t>Server Key Exchange</a:t>
+            </a:r>
+          </a:p>
+          <a:p>
+            <a:pPr lvl="1"/>
+            <a:r>
+              <a:rPr lang="en-US" dirty="0"/>
+              <a:t>Server Hello Done</a:t>
+            </a:r>
+            <a:endParaRPr lang="hi-IN" dirty="0"/>
+          </a:p>
+        </p:txBody>
+      </p:sp>
+    </p:spTree>
+    <p:extLst>
+      <p:ext uri="{BB962C8B-B14F-4D97-AF65-F5344CB8AC3E}">
+        <p14:creationId xmlns:p14="http://schemas.microsoft.com/office/powerpoint/2010/main" val="2831730663"/>
+      </p:ext>
+    </p:extLst>
+  </p:cSld>
+  <p:clrMapOvr>
+    <a:masterClrMapping/>
+  </p:clrMapOvr>
+</p:sld>
+</file>
+
+<file path=ppt/slides/slide8.xml><?xml version="1.0" encoding="utf-8"?>
+<p:sld xmlns:a="http://schemas.openxmlformats.org/drawingml/2006/main" xmlns:r="http://schemas.openxmlformats.org/officeDocument/2006/relationships" xmlns:p="http://schemas.openxmlformats.org/presentationml/2006/main">
+  <p:cSld>
+    <p:spTree>
+      <p:nvGrpSpPr>
+        <p:cNvPr id="1" name=""/>
+        <p:cNvGrpSpPr/>
+        <p:nvPr/>
+      </p:nvGrpSpPr>
+      <p:grpSpPr>
+        <a:xfrm>
+          <a:off x="0" y="0"/>
+          <a:ext cx="0" cy="0"/>
+          <a:chOff x="0" y="0"/>
+          <a:chExt cx="0" cy="0"/>
+        </a:xfrm>
+      </p:grpSpPr>
+      <p:sp>
+        <p:nvSpPr>
+          <p:cNvPr id="2" name="Title 1"/>
+          <p:cNvSpPr>
+            <a:spLocks noGrp="1"/>
+          </p:cNvSpPr>
+          <p:nvPr>
+            <p:ph type="title"/>
+          </p:nvPr>
+        </p:nvSpPr>
+        <p:spPr/>
+        <p:txBody>
+          <a:bodyPr/>
+          <a:lstStyle/>
+          <a:p>
+            <a:r>
+              <a:rPr lang="en-US" dirty="0"/>
+              <a:t>Code Fuzzing	</a:t>
+            </a:r>
+            <a:endParaRPr lang="hi-IN" dirty="0"/>
+          </a:p>
+        </p:txBody>
+      </p:sp>
+      <p:sp>
+        <p:nvSpPr>
+          <p:cNvPr id="3" name="Content Placeholder 2"/>
+          <p:cNvSpPr>
+            <a:spLocks noGrp="1"/>
+          </p:cNvSpPr>
+          <p:nvPr>
+            <p:ph idx="1"/>
+          </p:nvPr>
+        </p:nvSpPr>
+        <p:spPr/>
+        <p:txBody>
+          <a:bodyPr>
+            <a:normAutofit lnSpcReduction="10000"/>
+          </a:bodyPr>
+          <a:lstStyle/>
+          <a:p>
+            <a:r>
+              <a:rPr lang="en-US" dirty="0"/>
+              <a:t>In valid messages was created using RADAMSA, which is general purpose random </a:t>
+            </a:r>
+            <a:r>
+              <a:rPr lang="en-US" dirty="0" err="1"/>
+              <a:t>fuzzer</a:t>
+            </a:r>
+            <a:r>
+              <a:rPr lang="en-US" dirty="0"/>
+              <a:t>.</a:t>
+            </a:r>
+          </a:p>
+          <a:p>
+            <a:r>
+              <a:rPr lang="en-US" dirty="0"/>
+              <a:t>RADAMSA created malformed outputs based on sample input given.</a:t>
+            </a:r>
+          </a:p>
+          <a:p>
+            <a:r>
+              <a:rPr lang="en-US" dirty="0"/>
+              <a:t>Code was tested for 100 sample/random test cases created by RADAMSA.</a:t>
+            </a:r>
+          </a:p>
+          <a:p>
+            <a:r>
+              <a:rPr lang="en-US" dirty="0"/>
+              <a:t>The code did not crashed for any of the samples created by </a:t>
+            </a:r>
+            <a:r>
+              <a:rPr lang="en-US" dirty="0" err="1"/>
+              <a:t>fuzzer</a:t>
+            </a:r>
+            <a:r>
+              <a:rPr lang="en-US" dirty="0"/>
+              <a:t>.</a:t>
+            </a:r>
+            <a:endParaRPr lang="hi-IN" dirty="0"/>
+          </a:p>
+        </p:txBody>
+      </p:sp>
+    </p:spTree>
+    <p:extLst>
+      <p:ext uri="{BB962C8B-B14F-4D97-AF65-F5344CB8AC3E}">
+        <p14:creationId xmlns:p14="http://schemas.microsoft.com/office/powerpoint/2010/main" val="3100115823"/>
+      </p:ext>
+    </p:extLst>
   </p:cSld>
   <p:clrMapOvr>
     <a:masterClrMapping/>

</xml_diff>

<commit_message>
add distibution of work slide
</commit_message>
<xml_diff>
--- a/parser-presentation.pptx
+++ b/parser-presentation.pptx
@@ -13,6 +13,7 @@
     <p:sldId id="263" r:id="rId7"/>
     <p:sldId id="260" r:id="rId8"/>
     <p:sldId id="261" r:id="rId9"/>
+    <p:sldId id="264" r:id="rId10"/>
   </p:sldIdLst>
   <p:sldSz cx="9144000" cy="6858000" type="screen4x3"/>
   <p:notesSz cx="6858000" cy="9144000"/>
@@ -113,7 +114,7 @@
   </p:defaultTextStyle>
   <p:extLst>
     <p:ext uri="{EFAFB233-063F-42B5-8137-9DF3F51BA10A}">
-      <p15:sldGuideLst xmlns:p15="http://schemas.microsoft.com/office/powerpoint/2012/main">
+      <p15:sldGuideLst xmlns:p15="http://schemas.microsoft.com/office/powerpoint/2012/main" xmlns="">
         <p15:guide id="1" orient="horz" pos="2160">
           <p15:clr>
             <a:srgbClr val="A4A3A4"/>
@@ -309,7 +310,8 @@
           <a:p>
             <a:fld id="{071090A5-4B13-4620-ADE1-3276C2D13370}" type="datetimeFigureOut">
               <a:rPr lang="sk-SK" smtClean="0"/>
-              <a:t>11.10.2016</a:t>
+              <a:pPr/>
+              <a:t>12. 10. 2016</a:t>
             </a:fld>
             <a:endParaRPr lang="sk-SK"/>
           </a:p>
@@ -351,6 +353,7 @@
           <a:p>
             <a:fld id="{99A2BEB3-228F-4460-BC97-372243F0CF6F}" type="slidenum">
               <a:rPr lang="sk-SK" smtClean="0"/>
+              <a:pPr/>
               <a:t>‹#›</a:t>
             </a:fld>
             <a:endParaRPr lang="sk-SK"/>
@@ -472,7 +475,8 @@
           <a:p>
             <a:fld id="{071090A5-4B13-4620-ADE1-3276C2D13370}" type="datetimeFigureOut">
               <a:rPr lang="sk-SK" smtClean="0"/>
-              <a:t>11.10.2016</a:t>
+              <a:pPr/>
+              <a:t>12. 10. 2016</a:t>
             </a:fld>
             <a:endParaRPr lang="sk-SK"/>
           </a:p>
@@ -514,6 +518,7 @@
           <a:p>
             <a:fld id="{99A2BEB3-228F-4460-BC97-372243F0CF6F}" type="slidenum">
               <a:rPr lang="sk-SK" smtClean="0"/>
+              <a:pPr/>
               <a:t>‹#›</a:t>
             </a:fld>
             <a:endParaRPr lang="sk-SK"/>
@@ -645,7 +650,8 @@
           <a:p>
             <a:fld id="{071090A5-4B13-4620-ADE1-3276C2D13370}" type="datetimeFigureOut">
               <a:rPr lang="sk-SK" smtClean="0"/>
-              <a:t>11.10.2016</a:t>
+              <a:pPr/>
+              <a:t>12. 10. 2016</a:t>
             </a:fld>
             <a:endParaRPr lang="sk-SK"/>
           </a:p>
@@ -687,6 +693,7 @@
           <a:p>
             <a:fld id="{99A2BEB3-228F-4460-BC97-372243F0CF6F}" type="slidenum">
               <a:rPr lang="sk-SK" smtClean="0"/>
+              <a:pPr/>
               <a:t>‹#›</a:t>
             </a:fld>
             <a:endParaRPr lang="sk-SK"/>
@@ -808,7 +815,8 @@
           <a:p>
             <a:fld id="{071090A5-4B13-4620-ADE1-3276C2D13370}" type="datetimeFigureOut">
               <a:rPr lang="sk-SK" smtClean="0"/>
-              <a:t>11.10.2016</a:t>
+              <a:pPr/>
+              <a:t>12. 10. 2016</a:t>
             </a:fld>
             <a:endParaRPr lang="sk-SK"/>
           </a:p>
@@ -850,6 +858,7 @@
           <a:p>
             <a:fld id="{99A2BEB3-228F-4460-BC97-372243F0CF6F}" type="slidenum">
               <a:rPr lang="sk-SK" smtClean="0"/>
+              <a:pPr/>
               <a:t>‹#›</a:t>
             </a:fld>
             <a:endParaRPr lang="sk-SK"/>
@@ -1048,7 +1057,8 @@
           <a:p>
             <a:fld id="{071090A5-4B13-4620-ADE1-3276C2D13370}" type="datetimeFigureOut">
               <a:rPr lang="sk-SK" smtClean="0"/>
-              <a:t>11.10.2016</a:t>
+              <a:pPr/>
+              <a:t>12. 10. 2016</a:t>
             </a:fld>
             <a:endParaRPr lang="sk-SK"/>
           </a:p>
@@ -1090,6 +1100,7 @@
           <a:p>
             <a:fld id="{99A2BEB3-228F-4460-BC97-372243F0CF6F}" type="slidenum">
               <a:rPr lang="sk-SK" smtClean="0"/>
+              <a:pPr/>
               <a:t>‹#›</a:t>
             </a:fld>
             <a:endParaRPr lang="sk-SK"/>
@@ -1328,7 +1339,8 @@
           <a:p>
             <a:fld id="{071090A5-4B13-4620-ADE1-3276C2D13370}" type="datetimeFigureOut">
               <a:rPr lang="sk-SK" smtClean="0"/>
-              <a:t>11.10.2016</a:t>
+              <a:pPr/>
+              <a:t>12. 10. 2016</a:t>
             </a:fld>
             <a:endParaRPr lang="sk-SK"/>
           </a:p>
@@ -1370,6 +1382,7 @@
           <a:p>
             <a:fld id="{99A2BEB3-228F-4460-BC97-372243F0CF6F}" type="slidenum">
               <a:rPr lang="sk-SK" smtClean="0"/>
+              <a:pPr/>
               <a:t>‹#›</a:t>
             </a:fld>
             <a:endParaRPr lang="sk-SK"/>
@@ -1742,7 +1755,8 @@
           <a:p>
             <a:fld id="{071090A5-4B13-4620-ADE1-3276C2D13370}" type="datetimeFigureOut">
               <a:rPr lang="sk-SK" smtClean="0"/>
-              <a:t>11.10.2016</a:t>
+              <a:pPr/>
+              <a:t>12. 10. 2016</a:t>
             </a:fld>
             <a:endParaRPr lang="sk-SK"/>
           </a:p>
@@ -1784,6 +1798,7 @@
           <a:p>
             <a:fld id="{99A2BEB3-228F-4460-BC97-372243F0CF6F}" type="slidenum">
               <a:rPr lang="sk-SK" smtClean="0"/>
+              <a:pPr/>
               <a:t>‹#›</a:t>
             </a:fld>
             <a:endParaRPr lang="sk-SK"/>
@@ -1854,7 +1869,8 @@
           <a:p>
             <a:fld id="{071090A5-4B13-4620-ADE1-3276C2D13370}" type="datetimeFigureOut">
               <a:rPr lang="sk-SK" smtClean="0"/>
-              <a:t>11.10.2016</a:t>
+              <a:pPr/>
+              <a:t>12. 10. 2016</a:t>
             </a:fld>
             <a:endParaRPr lang="sk-SK"/>
           </a:p>
@@ -1896,6 +1912,7 @@
           <a:p>
             <a:fld id="{99A2BEB3-228F-4460-BC97-372243F0CF6F}" type="slidenum">
               <a:rPr lang="sk-SK" smtClean="0"/>
+              <a:pPr/>
               <a:t>‹#›</a:t>
             </a:fld>
             <a:endParaRPr lang="sk-SK"/>
@@ -1944,7 +1961,8 @@
           <a:p>
             <a:fld id="{071090A5-4B13-4620-ADE1-3276C2D13370}" type="datetimeFigureOut">
               <a:rPr lang="sk-SK" smtClean="0"/>
-              <a:t>11.10.2016</a:t>
+              <a:pPr/>
+              <a:t>12. 10. 2016</a:t>
             </a:fld>
             <a:endParaRPr lang="sk-SK"/>
           </a:p>
@@ -1986,6 +2004,7 @@
           <a:p>
             <a:fld id="{99A2BEB3-228F-4460-BC97-372243F0CF6F}" type="slidenum">
               <a:rPr lang="sk-SK" smtClean="0"/>
+              <a:pPr/>
               <a:t>‹#›</a:t>
             </a:fld>
             <a:endParaRPr lang="sk-SK"/>
@@ -2214,7 +2233,8 @@
           <a:p>
             <a:fld id="{071090A5-4B13-4620-ADE1-3276C2D13370}" type="datetimeFigureOut">
               <a:rPr lang="sk-SK" smtClean="0"/>
-              <a:t>11.10.2016</a:t>
+              <a:pPr/>
+              <a:t>12. 10. 2016</a:t>
             </a:fld>
             <a:endParaRPr lang="sk-SK"/>
           </a:p>
@@ -2256,6 +2276,7 @@
           <a:p>
             <a:fld id="{99A2BEB3-228F-4460-BC97-372243F0CF6F}" type="slidenum">
               <a:rPr lang="sk-SK" smtClean="0"/>
+              <a:pPr/>
               <a:t>‹#›</a:t>
             </a:fld>
             <a:endParaRPr lang="sk-SK"/>
@@ -2461,7 +2482,8 @@
           <a:p>
             <a:fld id="{071090A5-4B13-4620-ADE1-3276C2D13370}" type="datetimeFigureOut">
               <a:rPr lang="sk-SK" smtClean="0"/>
-              <a:t>11.10.2016</a:t>
+              <a:pPr/>
+              <a:t>12. 10. 2016</a:t>
             </a:fld>
             <a:endParaRPr lang="sk-SK"/>
           </a:p>
@@ -2503,6 +2525,7 @@
           <a:p>
             <a:fld id="{99A2BEB3-228F-4460-BC97-372243F0CF6F}" type="slidenum">
               <a:rPr lang="sk-SK" smtClean="0"/>
+              <a:pPr/>
               <a:t>‹#›</a:t>
             </a:fld>
             <a:endParaRPr lang="sk-SK"/>
@@ -2667,7 +2690,8 @@
           <a:p>
             <a:fld id="{071090A5-4B13-4620-ADE1-3276C2D13370}" type="datetimeFigureOut">
               <a:rPr lang="sk-SK" smtClean="0"/>
-              <a:t>11.10.2016</a:t>
+              <a:pPr/>
+              <a:t>12. 10. 2016</a:t>
             </a:fld>
             <a:endParaRPr lang="sk-SK"/>
           </a:p>
@@ -2745,6 +2769,7 @@
           <a:p>
             <a:fld id="{99A2BEB3-228F-4460-BC97-372243F0CF6F}" type="slidenum">
               <a:rPr lang="sk-SK" smtClean="0"/>
+              <a:pPr/>
               <a:t>‹#›</a:t>
             </a:fld>
             <a:endParaRPr lang="sk-SK"/>
@@ -4064,7 +4089,7 @@
     </p:spTree>
     <p:extLst>
       <p:ext uri="{BB962C8B-B14F-4D97-AF65-F5344CB8AC3E}">
-        <p14:creationId xmlns:p14="http://schemas.microsoft.com/office/powerpoint/2010/main" val="3518605626"/>
+        <p14:creationId xmlns:p14="http://schemas.microsoft.com/office/powerpoint/2010/main" xmlns="" val="3518605626"/>
       </p:ext>
     </p:extLst>
   </p:cSld>
@@ -4192,7 +4217,7 @@
     </p:spTree>
     <p:extLst>
       <p:ext uri="{BB962C8B-B14F-4D97-AF65-F5344CB8AC3E}">
-        <p14:creationId xmlns:p14="http://schemas.microsoft.com/office/powerpoint/2010/main" val="512497819"/>
+        <p14:creationId xmlns:p14="http://schemas.microsoft.com/office/powerpoint/2010/main" xmlns="" val="512497819"/>
       </p:ext>
     </p:extLst>
   </p:cSld>
@@ -4326,7 +4351,7 @@
     </p:spTree>
     <p:extLst>
       <p:ext uri="{BB962C8B-B14F-4D97-AF65-F5344CB8AC3E}">
-        <p14:creationId xmlns:p14="http://schemas.microsoft.com/office/powerpoint/2010/main" val="2831730663"/>
+        <p14:creationId xmlns:p14="http://schemas.microsoft.com/office/powerpoint/2010/main" xmlns="" val="2831730663"/>
       </p:ext>
     </p:extLst>
   </p:cSld>
@@ -4438,9 +4463,254 @@
     </p:spTree>
     <p:extLst>
       <p:ext uri="{BB962C8B-B14F-4D97-AF65-F5344CB8AC3E}">
-        <p14:creationId xmlns:p14="http://schemas.microsoft.com/office/powerpoint/2010/main" val="3100115823"/>
+        <p14:creationId xmlns:p14="http://schemas.microsoft.com/office/powerpoint/2010/main" xmlns="" val="3100115823"/>
       </p:ext>
     </p:extLst>
+  </p:cSld>
+  <p:clrMapOvr>
+    <a:masterClrMapping/>
+  </p:clrMapOvr>
+</p:sld>
+</file>
+
+<file path=ppt/slides/slide9.xml><?xml version="1.0" encoding="utf-8"?>
+<p:sld xmlns:a="http://schemas.openxmlformats.org/drawingml/2006/main" xmlns:r="http://schemas.openxmlformats.org/officeDocument/2006/relationships" xmlns:p="http://schemas.openxmlformats.org/presentationml/2006/main">
+  <p:cSld>
+    <p:spTree>
+      <p:nvGrpSpPr>
+        <p:cNvPr id="1" name=""/>
+        <p:cNvGrpSpPr/>
+        <p:nvPr/>
+      </p:nvGrpSpPr>
+      <p:grpSpPr>
+        <a:xfrm>
+          <a:off x="0" y="0"/>
+          <a:ext cx="0" cy="0"/>
+          <a:chOff x="0" y="0"/>
+          <a:chExt cx="0" cy="0"/>
+        </a:xfrm>
+      </p:grpSpPr>
+      <p:sp>
+        <p:nvSpPr>
+          <p:cNvPr id="2" name="Nadpis 1"/>
+          <p:cNvSpPr>
+            <a:spLocks noGrp="1"/>
+          </p:cNvSpPr>
+          <p:nvPr>
+            <p:ph type="title"/>
+          </p:nvPr>
+        </p:nvSpPr>
+        <p:spPr/>
+        <p:txBody>
+          <a:bodyPr/>
+          <a:lstStyle/>
+          <a:p>
+            <a:r>
+              <a:rPr lang="sk-SK" dirty="0" err="1" smtClean="0"/>
+              <a:t>Distribution</a:t>
+            </a:r>
+            <a:r>
+              <a:rPr lang="sk-SK" dirty="0" smtClean="0"/>
+              <a:t> </a:t>
+            </a:r>
+            <a:r>
+              <a:rPr lang="sk-SK" dirty="0" err="1" smtClean="0"/>
+              <a:t>of</a:t>
+            </a:r>
+            <a:r>
+              <a:rPr lang="sk-SK" dirty="0" smtClean="0"/>
+              <a:t> </a:t>
+            </a:r>
+            <a:r>
+              <a:rPr lang="sk-SK" dirty="0" err="1" smtClean="0"/>
+              <a:t>work</a:t>
+            </a:r>
+            <a:endParaRPr lang="sk-SK" dirty="0"/>
+          </a:p>
+        </p:txBody>
+      </p:sp>
+      <p:sp>
+        <p:nvSpPr>
+          <p:cNvPr id="3" name="Zástupný symbol obsahu 2"/>
+          <p:cNvSpPr>
+            <a:spLocks noGrp="1"/>
+          </p:cNvSpPr>
+          <p:nvPr>
+            <p:ph idx="1"/>
+          </p:nvPr>
+        </p:nvSpPr>
+        <p:spPr/>
+        <p:txBody>
+          <a:bodyPr>
+            <a:normAutofit/>
+          </a:bodyPr>
+          <a:lstStyle/>
+          <a:p>
+            <a:r>
+              <a:rPr lang="sk-SK" sz="2400" dirty="0" err="1" smtClean="0"/>
+              <a:t>Parser</a:t>
+            </a:r>
+            <a:r>
+              <a:rPr lang="sk-SK" sz="2400" dirty="0" smtClean="0"/>
+              <a:t> </a:t>
+            </a:r>
+            <a:r>
+              <a:rPr lang="sk-SK" sz="2400" dirty="0" err="1" smtClean="0"/>
+              <a:t>architecture</a:t>
+            </a:r>
+            <a:r>
+              <a:rPr lang="sk-SK" sz="2400" dirty="0" smtClean="0"/>
+              <a:t> </a:t>
+            </a:r>
+            <a:r>
+              <a:rPr lang="sk-SK" sz="2400" dirty="0" smtClean="0"/>
+              <a:t>/ </a:t>
+            </a:r>
+            <a:r>
+              <a:rPr lang="sk-SK" sz="2400" dirty="0" err="1" smtClean="0"/>
+              <a:t>overall</a:t>
+            </a:r>
+            <a:r>
+              <a:rPr lang="sk-SK" sz="2400" dirty="0" smtClean="0"/>
+              <a:t> </a:t>
+            </a:r>
+            <a:r>
+              <a:rPr lang="sk-SK" sz="2400" dirty="0" err="1" smtClean="0"/>
+              <a:t>processing</a:t>
+            </a:r>
+            <a:r>
+              <a:rPr lang="sk-SK" sz="2400" dirty="0" smtClean="0"/>
+              <a:t> </a:t>
+            </a:r>
+            <a:r>
+              <a:rPr lang="sk-SK" sz="2400" dirty="0" err="1" smtClean="0"/>
+              <a:t>flow</a:t>
+            </a:r>
+            <a:endParaRPr lang="sk-SK" sz="2400" dirty="0" smtClean="0"/>
+          </a:p>
+          <a:p>
+            <a:pPr lvl="1"/>
+            <a:r>
+              <a:rPr lang="sk-SK" sz="2400" dirty="0" smtClean="0"/>
+              <a:t>Martin </a:t>
+            </a:r>
+            <a:r>
+              <a:rPr lang="sk-SK" sz="2400" dirty="0" err="1" smtClean="0"/>
+              <a:t>Bajanik</a:t>
+            </a:r>
+            <a:endParaRPr lang="sk-SK" sz="2400" dirty="0" smtClean="0"/>
+          </a:p>
+          <a:p>
+            <a:r>
+              <a:rPr lang="sk-SK" sz="2400" dirty="0" smtClean="0"/>
+              <a:t>Server </a:t>
+            </a:r>
+            <a:r>
+              <a:rPr lang="en-US" sz="2400" dirty="0" smtClean="0"/>
+              <a:t>&amp; Client Hello messages parsing</a:t>
+            </a:r>
+          </a:p>
+          <a:p>
+            <a:pPr lvl="1"/>
+            <a:r>
+              <a:rPr lang="sk-SK" sz="2400" dirty="0" err="1" smtClean="0"/>
+              <a:t>Mayank</a:t>
+            </a:r>
+            <a:r>
+              <a:rPr lang="sk-SK" sz="2400" dirty="0" smtClean="0"/>
+              <a:t> </a:t>
+            </a:r>
+            <a:r>
+              <a:rPr lang="sk-SK" sz="2400" dirty="0" err="1" smtClean="0"/>
+              <a:t>Samadhiya</a:t>
+            </a:r>
+            <a:r>
+              <a:rPr lang="en-US" sz="2400" dirty="0" smtClean="0"/>
+              <a:t> and M</a:t>
+            </a:r>
+            <a:r>
+              <a:rPr lang="sk-SK" sz="2400" dirty="0" err="1" smtClean="0"/>
+              <a:t>ilan</a:t>
+            </a:r>
+            <a:r>
+              <a:rPr lang="sk-SK" sz="2400" dirty="0" smtClean="0"/>
+              <a:t> </a:t>
+            </a:r>
+            <a:r>
+              <a:rPr lang="en-US" sz="2400" dirty="0" smtClean="0"/>
+              <a:t>P</a:t>
+            </a:r>
+            <a:r>
+              <a:rPr lang="sk-SK" sz="2400" dirty="0" err="1" smtClean="0"/>
+              <a:t>atnaik</a:t>
+            </a:r>
+            <a:endParaRPr lang="en-US" sz="2400" dirty="0" smtClean="0"/>
+          </a:p>
+          <a:p>
+            <a:r>
+              <a:rPr lang="en-US" sz="2400" dirty="0" smtClean="0"/>
+              <a:t> Key Exchanges messages parsing</a:t>
+            </a:r>
+          </a:p>
+          <a:p>
+            <a:pPr lvl="1"/>
+            <a:r>
+              <a:rPr lang="sk-SK" sz="2400" dirty="0" err="1" smtClean="0"/>
+              <a:t>Mariami</a:t>
+            </a:r>
+            <a:r>
+              <a:rPr lang="sk-SK" sz="2400" dirty="0" smtClean="0"/>
+              <a:t> </a:t>
+            </a:r>
+            <a:r>
+              <a:rPr lang="sk-SK" sz="2400" dirty="0" err="1" smtClean="0"/>
+              <a:t>Gonashvili</a:t>
+            </a:r>
+            <a:endParaRPr lang="en-US" sz="2400" dirty="0" smtClean="0"/>
+          </a:p>
+          <a:p>
+            <a:r>
+              <a:rPr lang="en-US" sz="2400" dirty="0" smtClean="0"/>
+              <a:t>Test cases</a:t>
+            </a:r>
+          </a:p>
+          <a:p>
+            <a:pPr lvl="1"/>
+            <a:r>
+              <a:rPr lang="sk-SK" sz="2400" dirty="0" err="1" smtClean="0"/>
+              <a:t>Mayank</a:t>
+            </a:r>
+            <a:r>
+              <a:rPr lang="sk-SK" sz="2400" dirty="0" smtClean="0"/>
+              <a:t> </a:t>
+            </a:r>
+            <a:r>
+              <a:rPr lang="sk-SK" sz="2400" dirty="0" err="1" smtClean="0"/>
+              <a:t>Samadhiya</a:t>
+            </a:r>
+            <a:endParaRPr lang="en-US" sz="2400" dirty="0" smtClean="0"/>
+          </a:p>
+          <a:p>
+            <a:r>
+              <a:rPr lang="en-US" sz="2400" dirty="0" err="1" smtClean="0"/>
+              <a:t>Presetation</a:t>
+            </a:r>
+            <a:r>
+              <a:rPr lang="en-US" sz="2400" dirty="0" smtClean="0"/>
+              <a:t>, consultations and reviews</a:t>
+            </a:r>
+          </a:p>
+          <a:p>
+            <a:pPr lvl="1"/>
+            <a:r>
+              <a:rPr lang="en-US" sz="2400" dirty="0" smtClean="0"/>
+              <a:t>Everyone</a:t>
+            </a:r>
+            <a:endParaRPr lang="sk-SK" sz="2400" dirty="0" smtClean="0"/>
+          </a:p>
+        </p:txBody>
+      </p:sp>
+    </p:spTree>
   </p:cSld>
   <p:clrMapOvr>
     <a:masterClrMapping/>

</xml_diff>